<commit_message>
Added code sample for DotNET component/Assembly. PP might need work
</commit_message>
<xml_diff>
--- a/NEW KPU/KPU/Spørgsmål3DOTNET.pptx
+++ b/NEW KPU/KPU/Spørgsmål3DOTNET.pptx
@@ -6,11 +6,19 @@
   </p:sldMasterIdLst>
   <p:sldIdLst>
     <p:sldId id="256" r:id="rId2"/>
-    <p:sldId id="257" r:id="rId3"/>
-    <p:sldId id="258" r:id="rId4"/>
-    <p:sldId id="259" r:id="rId5"/>
-    <p:sldId id="260" r:id="rId6"/>
+    <p:sldId id="262" r:id="rId3"/>
+    <p:sldId id="257" r:id="rId4"/>
+    <p:sldId id="263" r:id="rId5"/>
+    <p:sldId id="259" r:id="rId6"/>
     <p:sldId id="261" r:id="rId7"/>
+    <p:sldId id="260" r:id="rId8"/>
+    <p:sldId id="264" r:id="rId9"/>
+    <p:sldId id="258" r:id="rId10"/>
+    <p:sldId id="265" r:id="rId11"/>
+    <p:sldId id="266" r:id="rId12"/>
+    <p:sldId id="267" r:id="rId13"/>
+    <p:sldId id="268" r:id="rId14"/>
+    <p:sldId id="269" r:id="rId15"/>
   </p:sldIdLst>
   <p:sldSz cx="12192000" cy="6858000"/>
   <p:notesSz cx="6858000" cy="9144000"/>
@@ -109,6 +117,11 @@
       </a:defRPr>
     </a:lvl9pPr>
   </p:defaultTextStyle>
+  <p:extLst>
+    <p:ext uri="{EFAFB233-063F-42B5-8137-9DF3F51BA10A}">
+      <p15:sldGuideLst xmlns:p15="http://schemas.microsoft.com/office/powerpoint/2012/main"/>
+    </p:ext>
+  </p:extLst>
 </p:presentation>
 </file>
 
@@ -261,7 +274,7 @@
           <a:p>
             <a:fld id="{9FBD7F75-2227-4511-94EA-2EC7D078D5F4}" type="datetimeFigureOut">
               <a:rPr lang="en-DK" smtClean="0"/>
-              <a:t>30/05/2020</a:t>
+              <a:t>31/07/2020</a:t>
             </a:fld>
             <a:endParaRPr lang="en-DK"/>
           </a:p>
@@ -315,7 +328,7 @@
           <a:p>
             <a:fld id="{40CE85F0-2818-4F44-B2C3-362C02BC3BF0}" type="slidenum">
               <a:rPr lang="en-DK" smtClean="0"/>
-              <a:t>‹nr.›</a:t>
+              <a:t>‹#›</a:t>
             </a:fld>
             <a:endParaRPr lang="en-DK"/>
           </a:p>
@@ -461,7 +474,7 @@
           <a:p>
             <a:fld id="{9FBD7F75-2227-4511-94EA-2EC7D078D5F4}" type="datetimeFigureOut">
               <a:rPr lang="en-DK" smtClean="0"/>
-              <a:t>30/05/2020</a:t>
+              <a:t>31/07/2020</a:t>
             </a:fld>
             <a:endParaRPr lang="en-DK"/>
           </a:p>
@@ -515,7 +528,7 @@
           <a:p>
             <a:fld id="{40CE85F0-2818-4F44-B2C3-362C02BC3BF0}" type="slidenum">
               <a:rPr lang="en-DK" smtClean="0"/>
-              <a:t>‹nr.›</a:t>
+              <a:t>‹#›</a:t>
             </a:fld>
             <a:endParaRPr lang="en-DK"/>
           </a:p>
@@ -671,7 +684,7 @@
           <a:p>
             <a:fld id="{9FBD7F75-2227-4511-94EA-2EC7D078D5F4}" type="datetimeFigureOut">
               <a:rPr lang="en-DK" smtClean="0"/>
-              <a:t>30/05/2020</a:t>
+              <a:t>31/07/2020</a:t>
             </a:fld>
             <a:endParaRPr lang="en-DK"/>
           </a:p>
@@ -725,7 +738,7 @@
           <a:p>
             <a:fld id="{40CE85F0-2818-4F44-B2C3-362C02BC3BF0}" type="slidenum">
               <a:rPr lang="en-DK" smtClean="0"/>
-              <a:t>‹nr.›</a:t>
+              <a:t>‹#›</a:t>
             </a:fld>
             <a:endParaRPr lang="en-DK"/>
           </a:p>
@@ -871,7 +884,7 @@
           <a:p>
             <a:fld id="{9FBD7F75-2227-4511-94EA-2EC7D078D5F4}" type="datetimeFigureOut">
               <a:rPr lang="en-DK" smtClean="0"/>
-              <a:t>30/05/2020</a:t>
+              <a:t>31/07/2020</a:t>
             </a:fld>
             <a:endParaRPr lang="en-DK"/>
           </a:p>
@@ -925,7 +938,7 @@
           <a:p>
             <a:fld id="{40CE85F0-2818-4F44-B2C3-362C02BC3BF0}" type="slidenum">
               <a:rPr lang="en-DK" smtClean="0"/>
-              <a:t>‹nr.›</a:t>
+              <a:t>‹#›</a:t>
             </a:fld>
             <a:endParaRPr lang="en-DK"/>
           </a:p>
@@ -1147,7 +1160,7 @@
           <a:p>
             <a:fld id="{9FBD7F75-2227-4511-94EA-2EC7D078D5F4}" type="datetimeFigureOut">
               <a:rPr lang="en-DK" smtClean="0"/>
-              <a:t>30/05/2020</a:t>
+              <a:t>31/07/2020</a:t>
             </a:fld>
             <a:endParaRPr lang="en-DK"/>
           </a:p>
@@ -1201,7 +1214,7 @@
           <a:p>
             <a:fld id="{40CE85F0-2818-4F44-B2C3-362C02BC3BF0}" type="slidenum">
               <a:rPr lang="en-DK" smtClean="0"/>
-              <a:t>‹nr.›</a:t>
+              <a:t>‹#›</a:t>
             </a:fld>
             <a:endParaRPr lang="en-DK"/>
           </a:p>
@@ -1415,7 +1428,7 @@
           <a:p>
             <a:fld id="{9FBD7F75-2227-4511-94EA-2EC7D078D5F4}" type="datetimeFigureOut">
               <a:rPr lang="en-DK" smtClean="0"/>
-              <a:t>30/05/2020</a:t>
+              <a:t>31/07/2020</a:t>
             </a:fld>
             <a:endParaRPr lang="en-DK"/>
           </a:p>
@@ -1469,7 +1482,7 @@
           <a:p>
             <a:fld id="{40CE85F0-2818-4F44-B2C3-362C02BC3BF0}" type="slidenum">
               <a:rPr lang="en-DK" smtClean="0"/>
-              <a:t>‹nr.›</a:t>
+              <a:t>‹#›</a:t>
             </a:fld>
             <a:endParaRPr lang="en-DK"/>
           </a:p>
@@ -1830,7 +1843,7 @@
           <a:p>
             <a:fld id="{9FBD7F75-2227-4511-94EA-2EC7D078D5F4}" type="datetimeFigureOut">
               <a:rPr lang="en-DK" smtClean="0"/>
-              <a:t>30/05/2020</a:t>
+              <a:t>31/07/2020</a:t>
             </a:fld>
             <a:endParaRPr lang="en-DK"/>
           </a:p>
@@ -1884,7 +1897,7 @@
           <a:p>
             <a:fld id="{40CE85F0-2818-4F44-B2C3-362C02BC3BF0}" type="slidenum">
               <a:rPr lang="en-DK" smtClean="0"/>
-              <a:t>‹nr.›</a:t>
+              <a:t>‹#›</a:t>
             </a:fld>
             <a:endParaRPr lang="en-DK"/>
           </a:p>
@@ -1972,7 +1985,7 @@
           <a:p>
             <a:fld id="{9FBD7F75-2227-4511-94EA-2EC7D078D5F4}" type="datetimeFigureOut">
               <a:rPr lang="en-DK" smtClean="0"/>
-              <a:t>30/05/2020</a:t>
+              <a:t>31/07/2020</a:t>
             </a:fld>
             <a:endParaRPr lang="en-DK"/>
           </a:p>
@@ -2026,7 +2039,7 @@
           <a:p>
             <a:fld id="{40CE85F0-2818-4F44-B2C3-362C02BC3BF0}" type="slidenum">
               <a:rPr lang="en-DK" smtClean="0"/>
-              <a:t>‹nr.›</a:t>
+              <a:t>‹#›</a:t>
             </a:fld>
             <a:endParaRPr lang="en-DK"/>
           </a:p>
@@ -2085,7 +2098,7 @@
           <a:p>
             <a:fld id="{9FBD7F75-2227-4511-94EA-2EC7D078D5F4}" type="datetimeFigureOut">
               <a:rPr lang="en-DK" smtClean="0"/>
-              <a:t>30/05/2020</a:t>
+              <a:t>31/07/2020</a:t>
             </a:fld>
             <a:endParaRPr lang="en-DK"/>
           </a:p>
@@ -2139,7 +2152,7 @@
           <a:p>
             <a:fld id="{40CE85F0-2818-4F44-B2C3-362C02BC3BF0}" type="slidenum">
               <a:rPr lang="en-DK" smtClean="0"/>
-              <a:t>‹nr.›</a:t>
+              <a:t>‹#›</a:t>
             </a:fld>
             <a:endParaRPr lang="en-DK"/>
           </a:p>
@@ -2398,7 +2411,7 @@
           <a:p>
             <a:fld id="{9FBD7F75-2227-4511-94EA-2EC7D078D5F4}" type="datetimeFigureOut">
               <a:rPr lang="en-DK" smtClean="0"/>
-              <a:t>30/05/2020</a:t>
+              <a:t>31/07/2020</a:t>
             </a:fld>
             <a:endParaRPr lang="en-DK"/>
           </a:p>
@@ -2452,7 +2465,7 @@
           <a:p>
             <a:fld id="{40CE85F0-2818-4F44-B2C3-362C02BC3BF0}" type="slidenum">
               <a:rPr lang="en-DK" smtClean="0"/>
-              <a:t>‹nr.›</a:t>
+              <a:t>‹#›</a:t>
             </a:fld>
             <a:endParaRPr lang="en-DK"/>
           </a:p>
@@ -2687,7 +2700,7 @@
           <a:p>
             <a:fld id="{9FBD7F75-2227-4511-94EA-2EC7D078D5F4}" type="datetimeFigureOut">
               <a:rPr lang="en-DK" smtClean="0"/>
-              <a:t>30/05/2020</a:t>
+              <a:t>31/07/2020</a:t>
             </a:fld>
             <a:endParaRPr lang="en-DK"/>
           </a:p>
@@ -2741,7 +2754,7 @@
           <a:p>
             <a:fld id="{40CE85F0-2818-4F44-B2C3-362C02BC3BF0}" type="slidenum">
               <a:rPr lang="en-DK" smtClean="0"/>
-              <a:t>‹nr.›</a:t>
+              <a:t>‹#›</a:t>
             </a:fld>
             <a:endParaRPr lang="en-DK"/>
           </a:p>
@@ -2930,7 +2943,7 @@
           <a:p>
             <a:fld id="{9FBD7F75-2227-4511-94EA-2EC7D078D5F4}" type="datetimeFigureOut">
               <a:rPr lang="en-DK" smtClean="0"/>
-              <a:t>30/05/2020</a:t>
+              <a:t>31/07/2020</a:t>
             </a:fld>
             <a:endParaRPr lang="en-DK"/>
           </a:p>
@@ -3020,7 +3033,7 @@
           <a:p>
             <a:fld id="{40CE85F0-2818-4F44-B2C3-362C02BC3BF0}" type="slidenum">
               <a:rPr lang="en-DK" smtClean="0"/>
-              <a:t>‹nr.›</a:t>
+              <a:t>‹#›</a:t>
             </a:fld>
             <a:endParaRPr lang="en-DK"/>
           </a:p>
@@ -3469,6 +3482,765 @@
 </p:sld>
 </file>
 
+<file path=ppt/slides/slide10.xml><?xml version="1.0" encoding="utf-8"?>
+<p:sld xmlns:a="http://schemas.openxmlformats.org/drawingml/2006/main" xmlns:r="http://schemas.openxmlformats.org/officeDocument/2006/relationships" xmlns:p="http://schemas.openxmlformats.org/presentationml/2006/main">
+  <p:cSld>
+    <p:spTree>
+      <p:nvGrpSpPr>
+        <p:cNvPr id="1" name=""/>
+        <p:cNvGrpSpPr/>
+        <p:nvPr/>
+      </p:nvGrpSpPr>
+      <p:grpSpPr>
+        <a:xfrm>
+          <a:off x="0" y="0"/>
+          <a:ext cx="0" cy="0"/>
+          <a:chOff x="0" y="0"/>
+          <a:chExt cx="0" cy="0"/>
+        </a:xfrm>
+      </p:grpSpPr>
+      <p:sp>
+        <p:nvSpPr>
+          <p:cNvPr id="2" name="Title 1">
+            <a:extLst>
+              <a:ext uri="{FF2B5EF4-FFF2-40B4-BE49-F238E27FC236}">
+                <a16:creationId xmlns:a16="http://schemas.microsoft.com/office/drawing/2014/main" id="{255682AC-20E4-47C2-9D37-8C1242CAA5A2}"/>
+              </a:ext>
+            </a:extLst>
+          </p:cNvPr>
+          <p:cNvSpPr>
+            <a:spLocks noGrp="1"/>
+          </p:cNvSpPr>
+          <p:nvPr>
+            <p:ph type="title"/>
+          </p:nvPr>
+        </p:nvSpPr>
+        <p:spPr/>
+        <p:txBody>
+          <a:bodyPr/>
+          <a:lstStyle/>
+          <a:p>
+            <a:r>
+              <a:rPr lang="en-US" dirty="0"/>
+              <a:t>The garbage Collector</a:t>
+            </a:r>
+            <a:br>
+              <a:rPr lang="en-US" dirty="0"/>
+            </a:br>
+            <a:endParaRPr lang="en-DK" dirty="0"/>
+          </a:p>
+        </p:txBody>
+      </p:sp>
+      <p:sp>
+        <p:nvSpPr>
+          <p:cNvPr id="3" name="Content Placeholder 2">
+            <a:extLst>
+              <a:ext uri="{FF2B5EF4-FFF2-40B4-BE49-F238E27FC236}">
+                <a16:creationId xmlns:a16="http://schemas.microsoft.com/office/drawing/2014/main" id="{766C8D77-1BBF-4276-A0B7-C630B3CD2C41}"/>
+              </a:ext>
+            </a:extLst>
+          </p:cNvPr>
+          <p:cNvSpPr>
+            <a:spLocks noGrp="1"/>
+          </p:cNvSpPr>
+          <p:nvPr>
+            <p:ph idx="1"/>
+          </p:nvPr>
+        </p:nvSpPr>
+        <p:spPr/>
+        <p:txBody>
+          <a:bodyPr/>
+          <a:lstStyle/>
+          <a:p>
+            <a:r>
+              <a:rPr lang="en-US" dirty="0"/>
+              <a:t>Garbage </a:t>
+            </a:r>
+            <a:r>
+              <a:rPr lang="en-US" dirty="0" err="1"/>
+              <a:t>collectoren</a:t>
+            </a:r>
+            <a:r>
+              <a:rPr lang="en-US" dirty="0"/>
+              <a:t> </a:t>
+            </a:r>
+            <a:r>
+              <a:rPr lang="en-US" dirty="0" err="1"/>
+              <a:t>er</a:t>
+            </a:r>
+            <a:r>
+              <a:rPr lang="en-US" dirty="0"/>
+              <a:t> </a:t>
+            </a:r>
+            <a:r>
+              <a:rPr lang="en-US" dirty="0" err="1"/>
+              <a:t>en</a:t>
+            </a:r>
+            <a:r>
+              <a:rPr lang="en-US" dirty="0"/>
+              <a:t> heap manager </a:t>
+            </a:r>
+          </a:p>
+          <a:p>
+            <a:r>
+              <a:rPr lang="en-US" dirty="0"/>
+              <a:t>Den har </a:t>
+            </a:r>
+            <a:r>
+              <a:rPr lang="en-US" dirty="0" err="1"/>
+              <a:t>til</a:t>
+            </a:r>
+            <a:r>
+              <a:rPr lang="en-US" dirty="0"/>
+              <a:t> </a:t>
+            </a:r>
+            <a:r>
+              <a:rPr lang="en-US" dirty="0" err="1"/>
+              <a:t>opgave</a:t>
+            </a:r>
+            <a:r>
+              <a:rPr lang="en-US" dirty="0"/>
+              <a:t> at </a:t>
+            </a:r>
+            <a:r>
+              <a:rPr lang="en-US" dirty="0" err="1"/>
+              <a:t>sørge</a:t>
+            </a:r>
+            <a:r>
+              <a:rPr lang="en-US" dirty="0"/>
+              <a:t> for at memory </a:t>
+            </a:r>
+            <a:r>
+              <a:rPr lang="en-US" dirty="0" err="1"/>
+              <a:t>bliver</a:t>
+            </a:r>
+            <a:r>
+              <a:rPr lang="en-US" dirty="0"/>
+              <a:t> </a:t>
+            </a:r>
+            <a:r>
+              <a:rPr lang="en-US" dirty="0" err="1"/>
+              <a:t>allokeret</a:t>
+            </a:r>
+            <a:r>
+              <a:rPr lang="en-US" dirty="0"/>
+              <a:t> </a:t>
+            </a:r>
+            <a:r>
+              <a:rPr lang="en-US" dirty="0" err="1"/>
+              <a:t>og</a:t>
+            </a:r>
+            <a:r>
+              <a:rPr lang="en-US" dirty="0"/>
+              <a:t> </a:t>
+            </a:r>
+            <a:r>
+              <a:rPr lang="en-US" dirty="0" err="1"/>
+              <a:t>deallokeret</a:t>
+            </a:r>
+            <a:r>
+              <a:rPr lang="en-US" dirty="0"/>
+              <a:t> </a:t>
+            </a:r>
+            <a:r>
+              <a:rPr lang="en-US" dirty="0" err="1"/>
+              <a:t>afhængig</a:t>
+            </a:r>
+            <a:r>
+              <a:rPr lang="en-US" dirty="0"/>
+              <a:t> om </a:t>
+            </a:r>
+            <a:r>
+              <a:rPr lang="en-US" dirty="0" err="1"/>
+              <a:t>resourcer</a:t>
+            </a:r>
+            <a:r>
+              <a:rPr lang="en-US" dirty="0"/>
+              <a:t> </a:t>
+            </a:r>
+            <a:r>
+              <a:rPr lang="en-US" dirty="0" err="1"/>
+              <a:t>er</a:t>
+            </a:r>
+            <a:r>
+              <a:rPr lang="en-US" dirty="0"/>
+              <a:t> </a:t>
+            </a:r>
+            <a:r>
+              <a:rPr lang="en-US" dirty="0" err="1"/>
+              <a:t>blevet</a:t>
+            </a:r>
+            <a:r>
+              <a:rPr lang="en-US" dirty="0"/>
+              <a:t> </a:t>
+            </a:r>
+            <a:r>
+              <a:rPr lang="en-US" dirty="0" err="1"/>
+              <a:t>construeret</a:t>
+            </a:r>
+            <a:r>
+              <a:rPr lang="en-US" dirty="0"/>
+              <a:t> </a:t>
+            </a:r>
+            <a:r>
+              <a:rPr lang="en-US" dirty="0" err="1"/>
+              <a:t>eller</a:t>
+            </a:r>
+            <a:r>
+              <a:rPr lang="en-US" dirty="0"/>
+              <a:t> </a:t>
+            </a:r>
+            <a:r>
+              <a:rPr lang="en-US" dirty="0" err="1"/>
+              <a:t>destrueret</a:t>
+            </a:r>
+            <a:r>
+              <a:rPr lang="en-US" dirty="0"/>
+              <a:t>, </a:t>
+            </a:r>
+            <a:r>
+              <a:rPr lang="en-US" dirty="0" err="1"/>
+              <a:t>således</a:t>
+            </a:r>
+            <a:r>
+              <a:rPr lang="en-US" dirty="0"/>
+              <a:t> at der </a:t>
+            </a:r>
+            <a:r>
+              <a:rPr lang="en-US" dirty="0" err="1"/>
+              <a:t>ikke</a:t>
+            </a:r>
+            <a:r>
+              <a:rPr lang="en-US" dirty="0"/>
+              <a:t> </a:t>
+            </a:r>
+            <a:r>
+              <a:rPr lang="en-US" dirty="0" err="1"/>
+              <a:t>sker</a:t>
+            </a:r>
+            <a:r>
+              <a:rPr lang="en-US" dirty="0"/>
+              <a:t> et memory overflow</a:t>
+            </a:r>
+          </a:p>
+          <a:p>
+            <a:endParaRPr lang="en-DK" dirty="0"/>
+          </a:p>
+        </p:txBody>
+      </p:sp>
+    </p:spTree>
+    <p:extLst>
+      <p:ext uri="{BB962C8B-B14F-4D97-AF65-F5344CB8AC3E}">
+        <p14:creationId xmlns:p14="http://schemas.microsoft.com/office/powerpoint/2010/main" val="2181684684"/>
+      </p:ext>
+    </p:extLst>
+  </p:cSld>
+  <p:clrMapOvr>
+    <a:masterClrMapping/>
+  </p:clrMapOvr>
+</p:sld>
+</file>
+
+<file path=ppt/slides/slide11.xml><?xml version="1.0" encoding="utf-8"?>
+<p:sld xmlns:a="http://schemas.openxmlformats.org/drawingml/2006/main" xmlns:r="http://schemas.openxmlformats.org/officeDocument/2006/relationships" xmlns:p="http://schemas.openxmlformats.org/presentationml/2006/main">
+  <p:cSld>
+    <p:spTree>
+      <p:nvGrpSpPr>
+        <p:cNvPr id="1" name=""/>
+        <p:cNvGrpSpPr/>
+        <p:nvPr/>
+      </p:nvGrpSpPr>
+      <p:grpSpPr>
+        <a:xfrm>
+          <a:off x="0" y="0"/>
+          <a:ext cx="0" cy="0"/>
+          <a:chOff x="0" y="0"/>
+          <a:chExt cx="0" cy="0"/>
+        </a:xfrm>
+      </p:grpSpPr>
+      <p:sp>
+        <p:nvSpPr>
+          <p:cNvPr id="2" name="Title 1">
+            <a:extLst>
+              <a:ext uri="{FF2B5EF4-FFF2-40B4-BE49-F238E27FC236}">
+                <a16:creationId xmlns:a16="http://schemas.microsoft.com/office/drawing/2014/main" id="{83599E0F-DBC0-43EC-808F-CA0DB6343B5E}"/>
+              </a:ext>
+            </a:extLst>
+          </p:cNvPr>
+          <p:cNvSpPr>
+            <a:spLocks noGrp="1"/>
+          </p:cNvSpPr>
+          <p:nvPr>
+            <p:ph type="title"/>
+          </p:nvPr>
+        </p:nvSpPr>
+        <p:spPr/>
+        <p:txBody>
+          <a:bodyPr/>
+          <a:lstStyle/>
+          <a:p>
+            <a:r>
+              <a:rPr lang="en-US" dirty="0"/>
+              <a:t>Memory Leak</a:t>
+            </a:r>
+            <a:endParaRPr lang="en-DK" dirty="0"/>
+          </a:p>
+        </p:txBody>
+      </p:sp>
+      <p:sp>
+        <p:nvSpPr>
+          <p:cNvPr id="3" name="Content Placeholder 2">
+            <a:extLst>
+              <a:ext uri="{FF2B5EF4-FFF2-40B4-BE49-F238E27FC236}">
+                <a16:creationId xmlns:a16="http://schemas.microsoft.com/office/drawing/2014/main" id="{38E6899B-6AE5-413A-B144-9F6362CB8389}"/>
+              </a:ext>
+            </a:extLst>
+          </p:cNvPr>
+          <p:cNvSpPr>
+            <a:spLocks noGrp="1"/>
+          </p:cNvSpPr>
+          <p:nvPr>
+            <p:ph idx="1"/>
+          </p:nvPr>
+        </p:nvSpPr>
+        <p:spPr/>
+        <p:txBody>
+          <a:bodyPr/>
+          <a:lstStyle/>
+          <a:p>
+            <a:r>
+              <a:rPr lang="en-US" dirty="0"/>
+              <a:t>Memory leaks </a:t>
+            </a:r>
+            <a:r>
+              <a:rPr lang="en-US" dirty="0" err="1"/>
+              <a:t>opstår</a:t>
+            </a:r>
+            <a:r>
+              <a:rPr lang="en-US" dirty="0"/>
+              <a:t> </a:t>
+            </a:r>
+            <a:r>
+              <a:rPr lang="en-US" dirty="0" err="1"/>
+              <a:t>når</a:t>
+            </a:r>
+            <a:r>
+              <a:rPr lang="en-US" dirty="0"/>
+              <a:t> </a:t>
+            </a:r>
+            <a:r>
+              <a:rPr lang="en-US" dirty="0" err="1"/>
+              <a:t>alokeret</a:t>
+            </a:r>
+            <a:r>
+              <a:rPr lang="en-US" dirty="0"/>
+              <a:t> data </a:t>
+            </a:r>
+            <a:r>
+              <a:rPr lang="en-US" dirty="0" err="1"/>
+              <a:t>fra</a:t>
+            </a:r>
+            <a:r>
+              <a:rPr lang="en-US" dirty="0"/>
+              <a:t> et </a:t>
+            </a:r>
+            <a:r>
+              <a:rPr lang="en-US" dirty="0" err="1"/>
+              <a:t>tidligere</a:t>
+            </a:r>
+            <a:r>
+              <a:rPr lang="en-US" dirty="0"/>
+              <a:t> object </a:t>
+            </a:r>
+            <a:r>
+              <a:rPr lang="en-US" dirty="0" err="1"/>
+              <a:t>ikke</a:t>
+            </a:r>
+            <a:r>
+              <a:rPr lang="en-US" dirty="0"/>
+              <a:t> </a:t>
+            </a:r>
+            <a:r>
+              <a:rPr lang="en-US" dirty="0" err="1"/>
+              <a:t>bliver</a:t>
+            </a:r>
+            <a:r>
+              <a:rPr lang="en-US" dirty="0"/>
+              <a:t> </a:t>
+            </a:r>
+            <a:r>
+              <a:rPr lang="en-US" dirty="0" err="1"/>
+              <a:t>dealokeret</a:t>
+            </a:r>
+            <a:r>
+              <a:rPr lang="en-US" dirty="0"/>
+              <a:t>.</a:t>
+            </a:r>
+          </a:p>
+          <a:p>
+            <a:endParaRPr lang="en-DK" dirty="0"/>
+          </a:p>
+        </p:txBody>
+      </p:sp>
+    </p:spTree>
+    <p:extLst>
+      <p:ext uri="{BB962C8B-B14F-4D97-AF65-F5344CB8AC3E}">
+        <p14:creationId xmlns:p14="http://schemas.microsoft.com/office/powerpoint/2010/main" val="1854318430"/>
+      </p:ext>
+    </p:extLst>
+  </p:cSld>
+  <p:clrMapOvr>
+    <a:masterClrMapping/>
+  </p:clrMapOvr>
+</p:sld>
+</file>
+
+<file path=ppt/slides/slide12.xml><?xml version="1.0" encoding="utf-8"?>
+<p:sld xmlns:a="http://schemas.openxmlformats.org/drawingml/2006/main" xmlns:r="http://schemas.openxmlformats.org/officeDocument/2006/relationships" xmlns:p="http://schemas.openxmlformats.org/presentationml/2006/main">
+  <p:cSld>
+    <p:spTree>
+      <p:nvGrpSpPr>
+        <p:cNvPr id="1" name=""/>
+        <p:cNvGrpSpPr/>
+        <p:nvPr/>
+      </p:nvGrpSpPr>
+      <p:grpSpPr>
+        <a:xfrm>
+          <a:off x="0" y="0"/>
+          <a:ext cx="0" cy="0"/>
+          <a:chOff x="0" y="0"/>
+          <a:chExt cx="0" cy="0"/>
+        </a:xfrm>
+      </p:grpSpPr>
+      <p:sp>
+        <p:nvSpPr>
+          <p:cNvPr id="2" name="Title 1">
+            <a:extLst>
+              <a:ext uri="{FF2B5EF4-FFF2-40B4-BE49-F238E27FC236}">
+                <a16:creationId xmlns:a16="http://schemas.microsoft.com/office/drawing/2014/main" id="{75A52626-79D8-49FC-AB8F-DB14FCA3C973}"/>
+              </a:ext>
+            </a:extLst>
+          </p:cNvPr>
+          <p:cNvSpPr>
+            <a:spLocks noGrp="1"/>
+          </p:cNvSpPr>
+          <p:nvPr>
+            <p:ph type="title"/>
+          </p:nvPr>
+        </p:nvSpPr>
+        <p:spPr/>
+        <p:txBody>
+          <a:bodyPr/>
+          <a:lstStyle/>
+          <a:p>
+            <a:r>
+              <a:rPr lang="en-US" dirty="0"/>
+              <a:t>Event</a:t>
+            </a:r>
+            <a:endParaRPr lang="en-DK" dirty="0"/>
+          </a:p>
+        </p:txBody>
+      </p:sp>
+      <p:sp>
+        <p:nvSpPr>
+          <p:cNvPr id="3" name="Content Placeholder 2">
+            <a:extLst>
+              <a:ext uri="{FF2B5EF4-FFF2-40B4-BE49-F238E27FC236}">
+                <a16:creationId xmlns:a16="http://schemas.microsoft.com/office/drawing/2014/main" id="{0078D846-21D7-48E6-8D39-0071F0413097}"/>
+              </a:ext>
+            </a:extLst>
+          </p:cNvPr>
+          <p:cNvSpPr>
+            <a:spLocks noGrp="1"/>
+          </p:cNvSpPr>
+          <p:nvPr>
+            <p:ph idx="1"/>
+          </p:nvPr>
+        </p:nvSpPr>
+        <p:spPr/>
+        <p:txBody>
+          <a:bodyPr/>
+          <a:lstStyle/>
+          <a:p>
+            <a:r>
+              <a:rPr lang="en-US" dirty="0" err="1"/>
+              <a:t>Hvis</a:t>
+            </a:r>
+            <a:r>
+              <a:rPr lang="en-US" dirty="0"/>
+              <a:t> der </a:t>
+            </a:r>
+            <a:r>
+              <a:rPr lang="en-US" dirty="0" err="1"/>
+              <a:t>er</a:t>
+            </a:r>
+            <a:r>
+              <a:rPr lang="en-US" dirty="0"/>
+              <a:t> et </a:t>
+            </a:r>
+            <a:r>
+              <a:rPr lang="en-US" dirty="0" err="1"/>
+              <a:t>Komponent</a:t>
+            </a:r>
+            <a:r>
+              <a:rPr lang="en-US" dirty="0"/>
+              <a:t> der </a:t>
+            </a:r>
+            <a:r>
+              <a:rPr lang="en-US" dirty="0" err="1"/>
+              <a:t>skal</a:t>
+            </a:r>
+            <a:r>
+              <a:rPr lang="en-US" dirty="0"/>
+              <a:t> </a:t>
+            </a:r>
+            <a:r>
+              <a:rPr lang="en-US" dirty="0" err="1"/>
+              <a:t>reagere</a:t>
+            </a:r>
+            <a:r>
+              <a:rPr lang="en-US" dirty="0"/>
+              <a:t> </a:t>
+            </a:r>
+            <a:r>
+              <a:rPr lang="en-US" dirty="0" err="1"/>
+              <a:t>på</a:t>
+            </a:r>
+            <a:r>
+              <a:rPr lang="en-US" dirty="0"/>
+              <a:t> </a:t>
+            </a:r>
+            <a:r>
+              <a:rPr lang="en-US" dirty="0" err="1"/>
+              <a:t>modtagelsen</a:t>
+            </a:r>
+            <a:r>
+              <a:rPr lang="en-US" dirty="0"/>
+              <a:t> </a:t>
+            </a:r>
+            <a:r>
+              <a:rPr lang="en-US" dirty="0" err="1"/>
+              <a:t>af</a:t>
+            </a:r>
+            <a:r>
+              <a:rPr lang="en-US" dirty="0"/>
+              <a:t> </a:t>
+            </a:r>
+            <a:r>
+              <a:rPr lang="en-US" dirty="0" err="1"/>
+              <a:t>noget</a:t>
+            </a:r>
+            <a:r>
+              <a:rPr lang="en-US" dirty="0"/>
+              <a:t> data </a:t>
+            </a:r>
+            <a:r>
+              <a:rPr lang="en-US" dirty="0" err="1"/>
+              <a:t>vil</a:t>
+            </a:r>
+            <a:r>
+              <a:rPr lang="en-US" dirty="0"/>
+              <a:t> events </a:t>
+            </a:r>
+            <a:r>
+              <a:rPr lang="en-US" dirty="0" err="1"/>
+              <a:t>bruges</a:t>
+            </a:r>
+            <a:r>
+              <a:rPr lang="en-US" dirty="0"/>
+              <a:t>.</a:t>
+            </a:r>
+          </a:p>
+          <a:p>
+            <a:r>
+              <a:rPr lang="en-US" dirty="0"/>
+              <a:t>An event is like when I was born. No one liked that event</a:t>
+            </a:r>
+            <a:endParaRPr lang="en-DK" dirty="0"/>
+          </a:p>
+        </p:txBody>
+      </p:sp>
+    </p:spTree>
+    <p:extLst>
+      <p:ext uri="{BB962C8B-B14F-4D97-AF65-F5344CB8AC3E}">
+        <p14:creationId xmlns:p14="http://schemas.microsoft.com/office/powerpoint/2010/main" val="2176688607"/>
+      </p:ext>
+    </p:extLst>
+  </p:cSld>
+  <p:clrMapOvr>
+    <a:masterClrMapping/>
+  </p:clrMapOvr>
+</p:sld>
+</file>
+
+<file path=ppt/slides/slide13.xml><?xml version="1.0" encoding="utf-8"?>
+<p:sld xmlns:a="http://schemas.openxmlformats.org/drawingml/2006/main" xmlns:r="http://schemas.openxmlformats.org/officeDocument/2006/relationships" xmlns:p="http://schemas.openxmlformats.org/presentationml/2006/main">
+  <p:cSld>
+    <p:spTree>
+      <p:nvGrpSpPr>
+        <p:cNvPr id="1" name=""/>
+        <p:cNvGrpSpPr/>
+        <p:nvPr/>
+      </p:nvGrpSpPr>
+      <p:grpSpPr>
+        <a:xfrm>
+          <a:off x="0" y="0"/>
+          <a:ext cx="0" cy="0"/>
+          <a:chOff x="0" y="0"/>
+          <a:chExt cx="0" cy="0"/>
+        </a:xfrm>
+      </p:grpSpPr>
+      <p:sp>
+        <p:nvSpPr>
+          <p:cNvPr id="2" name="Title 1">
+            <a:extLst>
+              <a:ext uri="{FF2B5EF4-FFF2-40B4-BE49-F238E27FC236}">
+                <a16:creationId xmlns:a16="http://schemas.microsoft.com/office/drawing/2014/main" id="{44BE4829-200D-48F9-819F-B9E5D2699F9A}"/>
+              </a:ext>
+            </a:extLst>
+          </p:cNvPr>
+          <p:cNvSpPr>
+            <a:spLocks noGrp="1"/>
+          </p:cNvSpPr>
+          <p:nvPr>
+            <p:ph type="title"/>
+          </p:nvPr>
+        </p:nvSpPr>
+        <p:spPr/>
+        <p:txBody>
+          <a:bodyPr/>
+          <a:lstStyle/>
+          <a:p>
+            <a:r>
+              <a:rPr lang="en-US" dirty="0"/>
+              <a:t>Weak References</a:t>
+            </a:r>
+            <a:endParaRPr lang="en-DK" dirty="0"/>
+          </a:p>
+        </p:txBody>
+      </p:sp>
+      <p:sp>
+        <p:nvSpPr>
+          <p:cNvPr id="3" name="Content Placeholder 2">
+            <a:extLst>
+              <a:ext uri="{FF2B5EF4-FFF2-40B4-BE49-F238E27FC236}">
+                <a16:creationId xmlns:a16="http://schemas.microsoft.com/office/drawing/2014/main" id="{3E40EC80-B502-41E0-8342-EC09B2EFBCCE}"/>
+              </a:ext>
+            </a:extLst>
+          </p:cNvPr>
+          <p:cNvSpPr>
+            <a:spLocks noGrp="1"/>
+          </p:cNvSpPr>
+          <p:nvPr>
+            <p:ph idx="1"/>
+          </p:nvPr>
+        </p:nvSpPr>
+        <p:spPr/>
+        <p:txBody>
+          <a:bodyPr/>
+          <a:lstStyle/>
+          <a:p>
+            <a:endParaRPr lang="en-DK"/>
+          </a:p>
+        </p:txBody>
+      </p:sp>
+    </p:spTree>
+    <p:extLst>
+      <p:ext uri="{BB962C8B-B14F-4D97-AF65-F5344CB8AC3E}">
+        <p14:creationId xmlns:p14="http://schemas.microsoft.com/office/powerpoint/2010/main" val="3484022039"/>
+      </p:ext>
+    </p:extLst>
+  </p:cSld>
+  <p:clrMapOvr>
+    <a:masterClrMapping/>
+  </p:clrMapOvr>
+</p:sld>
+</file>
+
+<file path=ppt/slides/slide14.xml><?xml version="1.0" encoding="utf-8"?>
+<p:sld xmlns:a="http://schemas.openxmlformats.org/drawingml/2006/main" xmlns:r="http://schemas.openxmlformats.org/officeDocument/2006/relationships" xmlns:p="http://schemas.openxmlformats.org/presentationml/2006/main">
+  <p:cSld>
+    <p:spTree>
+      <p:nvGrpSpPr>
+        <p:cNvPr id="1" name=""/>
+        <p:cNvGrpSpPr/>
+        <p:nvPr/>
+      </p:nvGrpSpPr>
+      <p:grpSpPr>
+        <a:xfrm>
+          <a:off x="0" y="0"/>
+          <a:ext cx="0" cy="0"/>
+          <a:chOff x="0" y="0"/>
+          <a:chExt cx="0" cy="0"/>
+        </a:xfrm>
+      </p:grpSpPr>
+      <p:sp>
+        <p:nvSpPr>
+          <p:cNvPr id="2" name="Title 1">
+            <a:extLst>
+              <a:ext uri="{FF2B5EF4-FFF2-40B4-BE49-F238E27FC236}">
+                <a16:creationId xmlns:a16="http://schemas.microsoft.com/office/drawing/2014/main" id="{4230268B-99E0-4A0F-8A27-789139845BDA}"/>
+              </a:ext>
+            </a:extLst>
+          </p:cNvPr>
+          <p:cNvSpPr>
+            <a:spLocks noGrp="1"/>
+          </p:cNvSpPr>
+          <p:nvPr>
+            <p:ph type="title"/>
+          </p:nvPr>
+        </p:nvSpPr>
+        <p:spPr/>
+        <p:txBody>
+          <a:bodyPr/>
+          <a:lstStyle/>
+          <a:p>
+            <a:r>
+              <a:rPr lang="en-US" dirty="0"/>
+              <a:t>Finalization</a:t>
+            </a:r>
+            <a:endParaRPr lang="en-DK" dirty="0"/>
+          </a:p>
+        </p:txBody>
+      </p:sp>
+      <p:sp>
+        <p:nvSpPr>
+          <p:cNvPr id="3" name="Content Placeholder 2">
+            <a:extLst>
+              <a:ext uri="{FF2B5EF4-FFF2-40B4-BE49-F238E27FC236}">
+                <a16:creationId xmlns:a16="http://schemas.microsoft.com/office/drawing/2014/main" id="{C7369EB4-1A0C-42F6-8C18-82CA3AAB0745}"/>
+              </a:ext>
+            </a:extLst>
+          </p:cNvPr>
+          <p:cNvSpPr>
+            <a:spLocks noGrp="1"/>
+          </p:cNvSpPr>
+          <p:nvPr>
+            <p:ph idx="1"/>
+          </p:nvPr>
+        </p:nvSpPr>
+        <p:spPr/>
+        <p:txBody>
+          <a:bodyPr/>
+          <a:lstStyle/>
+          <a:p>
+            <a:endParaRPr lang="en-DK"/>
+          </a:p>
+        </p:txBody>
+      </p:sp>
+    </p:spTree>
+    <p:extLst>
+      <p:ext uri="{BB962C8B-B14F-4D97-AF65-F5344CB8AC3E}">
+        <p14:creationId xmlns:p14="http://schemas.microsoft.com/office/powerpoint/2010/main" val="3198370961"/>
+      </p:ext>
+    </p:extLst>
+  </p:cSld>
+  <p:clrMapOvr>
+    <a:masterClrMapping/>
+  </p:clrMapOvr>
+</p:sld>
+</file>
+
 <file path=ppt/slides/slide2.xml><?xml version="1.0" encoding="utf-8"?>
 <p:sld xmlns:a="http://schemas.openxmlformats.org/drawingml/2006/main" xmlns:r="http://schemas.openxmlformats.org/officeDocument/2006/relationships" xmlns:p="http://schemas.openxmlformats.org/presentationml/2006/main">
   <p:cSld>
@@ -3488,10 +4260,10 @@
       </p:grpSpPr>
       <p:sp>
         <p:nvSpPr>
-          <p:cNvPr id="2" name="Titel 1">
-            <a:extLst>
-              <a:ext uri="{FF2B5EF4-FFF2-40B4-BE49-F238E27FC236}">
-                <a16:creationId xmlns:a16="http://schemas.microsoft.com/office/drawing/2014/main" id="{68FC1235-4C01-4A2C-8C9E-154FC3AA1048}"/>
+          <p:cNvPr id="2" name="Title 1">
+            <a:extLst>
+              <a:ext uri="{FF2B5EF4-FFF2-40B4-BE49-F238E27FC236}">
+                <a16:creationId xmlns:a16="http://schemas.microsoft.com/office/drawing/2014/main" id="{F21D88CF-9C22-45FC-945D-A2B8C3BDA2D0}"/>
               </a:ext>
             </a:extLst>
           </p:cNvPr>
@@ -3509,39 +4281,7 @@
           <a:p>
             <a:r>
               <a:rPr lang="en-US" dirty="0"/>
-              <a:t>D</a:t>
-            </a:r>
-            <a:r>
-              <a:rPr lang="en-DK" dirty="0"/>
-              <a:t>e</a:t>
-            </a:r>
-            <a:r>
-              <a:rPr lang="en-US" dirty="0"/>
-              <a:t>l</a:t>
-            </a:r>
-            <a:r>
-              <a:rPr lang="en-DK" dirty="0"/>
-              <a:t>e </a:t>
-            </a:r>
-            <a:r>
-              <a:rPr lang="en-US" dirty="0" err="1"/>
-              <a:t>i</a:t>
-            </a:r>
-            <a:r>
-              <a:rPr lang="en-DK" dirty="0"/>
-              <a:t> .</a:t>
-            </a:r>
-            <a:r>
-              <a:rPr lang="en-US" dirty="0"/>
-              <a:t>N</a:t>
-            </a:r>
-            <a:r>
-              <a:rPr lang="en-DK" dirty="0"/>
-              <a:t>E</a:t>
-            </a:r>
-            <a:r>
-              <a:rPr lang="en-US" dirty="0"/>
-              <a:t>T</a:t>
+              <a:t>Evolution 	</a:t>
             </a:r>
             <a:endParaRPr lang="en-DK" dirty="0"/>
           </a:p>
@@ -3549,10 +4289,10 @@
       </p:sp>
       <p:sp>
         <p:nvSpPr>
-          <p:cNvPr id="3" name="Pladsholder til indhold 2">
-            <a:extLst>
-              <a:ext uri="{FF2B5EF4-FFF2-40B4-BE49-F238E27FC236}">
-                <a16:creationId xmlns:a16="http://schemas.microsoft.com/office/drawing/2014/main" id="{48674650-3316-463E-8EF5-A2EFC8895933}"/>
+          <p:cNvPr id="3" name="Content Placeholder 2">
+            <a:extLst>
+              <a:ext uri="{FF2B5EF4-FFF2-40B4-BE49-F238E27FC236}">
+                <a16:creationId xmlns:a16="http://schemas.microsoft.com/office/drawing/2014/main" id="{1C01D938-1721-4A8D-8875-DDCBFC8C3DBC}"/>
               </a:ext>
             </a:extLst>
           </p:cNvPr>
@@ -3568,6 +4308,253 @@
           <a:bodyPr/>
           <a:lstStyle/>
           <a:p>
+            <a:r>
+              <a:rPr lang="en-US" dirty="0"/>
+              <a:t>Vi started </a:t>
+            </a:r>
+            <a:r>
+              <a:rPr lang="en-US" dirty="0" err="1"/>
+              <a:t>af</a:t>
+            </a:r>
+            <a:r>
+              <a:rPr lang="en-US" dirty="0"/>
+              <a:t> med COM</a:t>
+            </a:r>
+          </a:p>
+          <a:p>
+            <a:r>
+              <a:rPr lang="en-US" dirty="0"/>
+              <a:t>COM </a:t>
+            </a:r>
+            <a:r>
+              <a:rPr lang="en-US" dirty="0" err="1"/>
+              <a:t>gjorde</a:t>
+            </a:r>
+            <a:r>
+              <a:rPr lang="en-US" dirty="0"/>
+              <a:t> det </a:t>
+            </a:r>
+            <a:r>
+              <a:rPr lang="en-US" dirty="0" err="1"/>
+              <a:t>muligt</a:t>
+            </a:r>
+            <a:r>
+              <a:rPr lang="en-US" dirty="0"/>
+              <a:t> at </a:t>
+            </a:r>
+            <a:r>
+              <a:rPr lang="en-US" dirty="0" err="1"/>
+              <a:t>binde</a:t>
+            </a:r>
+            <a:r>
+              <a:rPr lang="en-US" dirty="0"/>
+              <a:t> </a:t>
+            </a:r>
+            <a:r>
+              <a:rPr lang="en-US" dirty="0" err="1"/>
+              <a:t>komponenter</a:t>
+            </a:r>
+            <a:r>
+              <a:rPr lang="en-US" dirty="0"/>
+              <a:t> </a:t>
+            </a:r>
+            <a:r>
+              <a:rPr lang="en-US" dirty="0" err="1"/>
+              <a:t>sammen</a:t>
+            </a:r>
+            <a:endParaRPr lang="en-US" dirty="0"/>
+          </a:p>
+          <a:p>
+            <a:r>
+              <a:rPr lang="en-US" dirty="0"/>
+              <a:t>Der var </a:t>
+            </a:r>
+            <a:r>
+              <a:rPr lang="en-US" dirty="0" err="1"/>
+              <a:t>krav</a:t>
+            </a:r>
+            <a:r>
+              <a:rPr lang="en-US" dirty="0"/>
+              <a:t> </a:t>
+            </a:r>
+            <a:r>
+              <a:rPr lang="en-US" dirty="0" err="1"/>
+              <a:t>fra</a:t>
+            </a:r>
+            <a:r>
+              <a:rPr lang="en-US" dirty="0"/>
+              <a:t> </a:t>
+            </a:r>
+            <a:r>
+              <a:rPr lang="en-US" dirty="0" err="1"/>
+              <a:t>applikationerne</a:t>
+            </a:r>
+            <a:endParaRPr lang="en-US" dirty="0"/>
+          </a:p>
+          <a:p>
+            <a:pPr lvl="1"/>
+            <a:r>
+              <a:rPr lang="en-US" dirty="0"/>
+              <a:t>De </a:t>
+            </a:r>
+            <a:r>
+              <a:rPr lang="en-US" dirty="0" err="1"/>
+              <a:t>skulle</a:t>
+            </a:r>
+            <a:r>
+              <a:rPr lang="en-US" dirty="0"/>
+              <a:t> </a:t>
+            </a:r>
+            <a:r>
+              <a:rPr lang="en-US" dirty="0" err="1"/>
+              <a:t>selv</a:t>
+            </a:r>
+            <a:r>
+              <a:rPr lang="en-US" dirty="0"/>
+              <a:t> </a:t>
+            </a:r>
+            <a:r>
+              <a:rPr lang="en-US" dirty="0" err="1"/>
+              <a:t>sørge</a:t>
+            </a:r>
+            <a:r>
+              <a:rPr lang="en-US" dirty="0"/>
+              <a:t> for at </a:t>
+            </a:r>
+            <a:r>
+              <a:rPr lang="en-US" dirty="0" err="1"/>
+              <a:t>være</a:t>
+            </a:r>
+            <a:r>
+              <a:rPr lang="en-US" dirty="0"/>
+              <a:t> </a:t>
+            </a:r>
+            <a:r>
+              <a:rPr lang="en-US" dirty="0" err="1"/>
+              <a:t>integreret</a:t>
+            </a:r>
+            <a:r>
+              <a:rPr lang="en-US" dirty="0"/>
+              <a:t> </a:t>
+            </a:r>
+            <a:r>
+              <a:rPr lang="en-US" dirty="0" err="1"/>
+              <a:t>således</a:t>
+            </a:r>
+            <a:r>
+              <a:rPr lang="en-US" dirty="0"/>
+              <a:t> at der </a:t>
+            </a:r>
+            <a:r>
+              <a:rPr lang="en-US" dirty="0" err="1"/>
+              <a:t>kunne</a:t>
+            </a:r>
+            <a:r>
+              <a:rPr lang="en-US" dirty="0"/>
+              <a:t> </a:t>
+            </a:r>
+            <a:r>
+              <a:rPr lang="en-US" dirty="0" err="1"/>
+              <a:t>forbindes</a:t>
+            </a:r>
+            <a:r>
+              <a:rPr lang="en-US" dirty="0"/>
+              <a:t> </a:t>
+            </a:r>
+            <a:r>
+              <a:rPr lang="en-US" dirty="0" err="1"/>
+              <a:t>til</a:t>
+            </a:r>
+            <a:r>
+              <a:rPr lang="en-US" dirty="0"/>
+              <a:t> dem. (DLL </a:t>
+            </a:r>
+            <a:r>
+              <a:rPr lang="en-US" dirty="0" err="1"/>
+              <a:t>og</a:t>
+            </a:r>
+            <a:r>
+              <a:rPr lang="en-US" dirty="0"/>
+              <a:t> </a:t>
+            </a:r>
+            <a:r>
+              <a:rPr lang="en-US" dirty="0" err="1"/>
+              <a:t>lignende</a:t>
+            </a:r>
+            <a:r>
+              <a:rPr lang="en-US" dirty="0"/>
+              <a:t>)</a:t>
+            </a:r>
+          </a:p>
+          <a:p>
+            <a:pPr lvl="1"/>
+            <a:r>
+              <a:rPr lang="en-US" dirty="0" err="1"/>
+              <a:t>Samtidig</a:t>
+            </a:r>
+            <a:r>
+              <a:rPr lang="en-US" dirty="0"/>
+              <a:t> </a:t>
+            </a:r>
+            <a:r>
+              <a:rPr lang="en-US" dirty="0" err="1"/>
+              <a:t>kunne</a:t>
+            </a:r>
+            <a:r>
+              <a:rPr lang="en-US" dirty="0"/>
+              <a:t> </a:t>
+            </a:r>
+            <a:r>
+              <a:rPr lang="en-US" dirty="0" err="1"/>
+              <a:t>objekter</a:t>
+            </a:r>
+            <a:r>
+              <a:rPr lang="en-US" dirty="0"/>
+              <a:t> </a:t>
+            </a:r>
+            <a:r>
+              <a:rPr lang="en-US" dirty="0" err="1"/>
+              <a:t>ikek</a:t>
+            </a:r>
+            <a:r>
+              <a:rPr lang="en-US" dirty="0"/>
+              <a:t> tale </a:t>
+            </a:r>
+            <a:r>
+              <a:rPr lang="en-US" dirty="0" err="1"/>
+              <a:t>sammen</a:t>
+            </a:r>
+            <a:r>
+              <a:rPr lang="en-US" dirty="0"/>
+              <a:t> </a:t>
+            </a:r>
+            <a:r>
+              <a:rPr lang="en-US" dirty="0" err="1"/>
+              <a:t>direkte</a:t>
+            </a:r>
+            <a:endParaRPr lang="en-US" dirty="0"/>
+          </a:p>
+          <a:p>
+            <a:r>
+              <a:rPr lang="en-US" dirty="0" err="1"/>
+              <a:t>Herefter</a:t>
+            </a:r>
+            <a:r>
+              <a:rPr lang="en-US" dirty="0"/>
+              <a:t> </a:t>
+            </a:r>
+            <a:r>
+              <a:rPr lang="en-US" dirty="0" err="1"/>
+              <a:t>kom</a:t>
+            </a:r>
+            <a:r>
+              <a:rPr lang="en-US" dirty="0"/>
+              <a:t> .NET </a:t>
+            </a:r>
+            <a:r>
+              <a:rPr lang="en-US" dirty="0" err="1"/>
+              <a:t>modelen</a:t>
+            </a:r>
             <a:endParaRPr lang="en-DK" dirty="0"/>
           </a:p>
         </p:txBody>
@@ -3575,7 +4562,7 @@
     </p:spTree>
     <p:extLst>
       <p:ext uri="{BB962C8B-B14F-4D97-AF65-F5344CB8AC3E}">
-        <p14:creationId xmlns:p14="http://schemas.microsoft.com/office/powerpoint/2010/main" val="1957041346"/>
+        <p14:creationId xmlns:p14="http://schemas.microsoft.com/office/powerpoint/2010/main" val="4183852333"/>
       </p:ext>
     </p:extLst>
   </p:cSld>
@@ -3588,6 +4575,14 @@
 <file path=ppt/slides/slide3.xml><?xml version="1.0" encoding="utf-8"?>
 <p:sld xmlns:a="http://schemas.openxmlformats.org/drawingml/2006/main" xmlns:r="http://schemas.openxmlformats.org/officeDocument/2006/relationships" xmlns:p="http://schemas.openxmlformats.org/presentationml/2006/main">
   <p:cSld>
+    <p:bg>
+      <p:bgPr>
+        <a:solidFill>
+          <a:schemeClr val="bg1"/>
+        </a:solidFill>
+        <a:effectLst/>
+      </p:bgPr>
+    </p:bg>
     <p:spTree>
       <p:nvGrpSpPr>
         <p:cNvPr id="1" name=""/>
@@ -3607,7 +4602,7 @@
           <p:cNvPr id="2" name="Titel 1">
             <a:extLst>
               <a:ext uri="{FF2B5EF4-FFF2-40B4-BE49-F238E27FC236}">
-                <a16:creationId xmlns:a16="http://schemas.microsoft.com/office/drawing/2014/main" id="{0F613089-72EC-4ED7-9E33-99BD386B2CAD}"/>
+                <a16:creationId xmlns:a16="http://schemas.microsoft.com/office/drawing/2014/main" id="{68FC1235-4C01-4A2C-8C9E-154FC3AA1048}"/>
               </a:ext>
             </a:extLst>
           </p:cNvPr>
@@ -3618,23 +4613,39 @@
             <p:ph type="title"/>
           </p:nvPr>
         </p:nvSpPr>
-        <p:spPr/>
-        <p:txBody>
-          <a:bodyPr/>
-          <a:lstStyle/>
-          <a:p>
-            <a:r>
-              <a:rPr lang="en-US" dirty="0"/>
-              <a:t>L</a:t>
-            </a:r>
-            <a:r>
-              <a:rPr lang="en-DK" dirty="0" err="1"/>
-              <a:t>ifecycle</a:t>
-            </a:r>
-            <a:r>
-              <a:rPr lang="en-DK" dirty="0"/>
-              <a:t> management</a:t>
-            </a:r>
+        <p:spPr>
+          <a:xfrm>
+            <a:off x="648929" y="629266"/>
+            <a:ext cx="3505495" cy="1622321"/>
+          </a:xfrm>
+        </p:spPr>
+        <p:txBody>
+          <a:bodyPr>
+            <a:normAutofit/>
+          </a:bodyPr>
+          <a:lstStyle/>
+          <a:p>
+            <a:r>
+              <a:rPr lang="en-US"/>
+              <a:t>Model i</a:t>
+            </a:r>
+            <a:r>
+              <a:rPr lang="en-DK"/>
+              <a:t> .</a:t>
+            </a:r>
+            <a:r>
+              <a:rPr lang="en-US"/>
+              <a:t>N</a:t>
+            </a:r>
+            <a:r>
+              <a:rPr lang="en-DK"/>
+              <a:t>E</a:t>
+            </a:r>
+            <a:r>
+              <a:rPr lang="en-US"/>
+              <a:t>T</a:t>
+            </a:r>
+            <a:endParaRPr lang="en-DK" dirty="0"/>
           </a:p>
         </p:txBody>
       </p:sp>
@@ -3643,7 +4654,7 @@
           <p:cNvPr id="3" name="Pladsholder til indhold 2">
             <a:extLst>
               <a:ext uri="{FF2B5EF4-FFF2-40B4-BE49-F238E27FC236}">
-                <a16:creationId xmlns:a16="http://schemas.microsoft.com/office/drawing/2014/main" id="{F9967604-D824-4702-8D3C-1251F9A6ECEB}"/>
+                <a16:creationId xmlns:a16="http://schemas.microsoft.com/office/drawing/2014/main" id="{48674650-3316-463E-8EF5-A2EFC8895933}"/>
               </a:ext>
             </a:extLst>
           </p:cNvPr>
@@ -3654,19 +4665,218 @@
             <p:ph idx="1"/>
           </p:nvPr>
         </p:nvSpPr>
-        <p:spPr/>
-        <p:txBody>
-          <a:bodyPr/>
-          <a:lstStyle/>
-          <a:p>
-            <a:endParaRPr lang="en-DK"/>
-          </a:p>
-        </p:txBody>
-      </p:sp>
+        <p:spPr>
+          <a:xfrm>
+            <a:off x="648931" y="2438400"/>
+            <a:ext cx="3505494" cy="3785419"/>
+          </a:xfrm>
+        </p:spPr>
+        <p:txBody>
+          <a:bodyPr>
+            <a:normAutofit/>
+          </a:bodyPr>
+          <a:lstStyle/>
+          <a:p>
+            <a:r>
+              <a:rPr lang="en-US" sz="2000"/>
+              <a:t>.NET modellen gør det nemere at bygge komponenter</a:t>
+            </a:r>
+          </a:p>
+          <a:p>
+            <a:r>
+              <a:rPr lang="en-US" sz="2000"/>
+              <a:t>Måden det sker på er ved at alle komponenter har samme fundament</a:t>
+            </a:r>
+          </a:p>
+          <a:p>
+            <a:r>
+              <a:rPr lang="en-US" sz="2000"/>
+              <a:t>Dette gør direkte kommunikation muligt mellem objekter I forskellige applikationer.</a:t>
+            </a:r>
+          </a:p>
+          <a:p>
+            <a:r>
+              <a:rPr lang="en-US" sz="2000"/>
+              <a:t>Dette er muligt grundet CLR common language runtime.</a:t>
+            </a:r>
+          </a:p>
+          <a:p>
+            <a:endParaRPr lang="en-DK" sz="2000"/>
+          </a:p>
+        </p:txBody>
+      </p:sp>
+      <p:sp>
+        <p:nvSpPr>
+          <p:cNvPr id="9" name="Rectangle 8">
+            <a:extLst>
+              <a:ext uri="{FF2B5EF4-FFF2-40B4-BE49-F238E27FC236}">
+                <a16:creationId xmlns:a16="http://schemas.microsoft.com/office/drawing/2014/main" id="{5E39A796-BE83-48B1-B33F-35C4A32AAB57}"/>
+              </a:ext>
+              <a:ext uri="{C183D7F6-B498-43B3-948B-1728B52AA6E4}">
+                <adec:decorative xmlns:adec="http://schemas.microsoft.com/office/drawing/2017/decorative" val="1"/>
+              </a:ext>
+            </a:extLst>
+          </p:cNvPr>
+          <p:cNvSpPr>
+            <a:spLocks noGrp="1" noRot="1" noChangeAspect="1" noMove="1" noResize="1" noEditPoints="1" noAdjustHandles="1" noChangeArrowheads="1" noChangeShapeType="1" noTextEdit="1"/>
+          </p:cNvSpPr>
+          <p:nvPr>
+            <p:extLst>
+              <p:ext uri="{386F3935-93C4-4BCD-93E2-E3B085C9AB24}">
+                <p16:designElem xmlns:p16="http://schemas.microsoft.com/office/powerpoint/2015/main" val="1"/>
+              </p:ext>
+            </p:extLst>
+          </p:nvPr>
+        </p:nvSpPr>
+        <p:spPr>
+          <a:xfrm>
+            <a:off x="4639056" y="0"/>
+            <a:ext cx="7552944" cy="6858000"/>
+          </a:xfrm>
+          <a:prstGeom prst="rect">
+            <a:avLst/>
+          </a:prstGeom>
+          <a:solidFill>
+            <a:srgbClr val="C8CACA"/>
+          </a:solidFill>
+          <a:ln>
+            <a:noFill/>
+          </a:ln>
+        </p:spPr>
+        <p:style>
+          <a:lnRef idx="2">
+            <a:schemeClr val="accent1">
+              <a:shade val="50000"/>
+            </a:schemeClr>
+          </a:lnRef>
+          <a:fillRef idx="1">
+            <a:schemeClr val="accent1"/>
+          </a:fillRef>
+          <a:effectRef idx="0">
+            <a:schemeClr val="accent1"/>
+          </a:effectRef>
+          <a:fontRef idx="minor">
+            <a:schemeClr val="lt1"/>
+          </a:fontRef>
+        </p:style>
+        <p:txBody>
+          <a:bodyPr rtlCol="0" anchor="ctr"/>
+          <a:lstStyle/>
+          <a:p>
+            <a:pPr algn="ctr"/>
+            <a:endParaRPr lang="en-US"/>
+          </a:p>
+        </p:txBody>
+      </p:sp>
+      <p:sp>
+        <p:nvSpPr>
+          <p:cNvPr id="11" name="Rounded Rectangle 9">
+            <a:extLst>
+              <a:ext uri="{FF2B5EF4-FFF2-40B4-BE49-F238E27FC236}">
+                <a16:creationId xmlns:a16="http://schemas.microsoft.com/office/drawing/2014/main" id="{72F84B47-E267-4194-8194-831DB7B5547F}"/>
+              </a:ext>
+              <a:ext uri="{C183D7F6-B498-43B3-948B-1728B52AA6E4}">
+                <adec:decorative xmlns:adec="http://schemas.microsoft.com/office/drawing/2017/decorative" val="1"/>
+              </a:ext>
+            </a:extLst>
+          </p:cNvPr>
+          <p:cNvSpPr>
+            <a:spLocks noGrp="1" noRot="1" noChangeAspect="1" noMove="1" noResize="1" noEditPoints="1" noAdjustHandles="1" noChangeArrowheads="1" noChangeShapeType="1" noTextEdit="1"/>
+          </p:cNvSpPr>
+          <p:nvPr>
+            <p:extLst>
+              <p:ext uri="{386F3935-93C4-4BCD-93E2-E3B085C9AB24}">
+                <p16:designElem xmlns:p16="http://schemas.microsoft.com/office/powerpoint/2015/main" val="1"/>
+              </p:ext>
+            </p:extLst>
+          </p:nvPr>
+        </p:nvSpPr>
+        <p:spPr>
+          <a:xfrm>
+            <a:off x="5123688" y="557784"/>
+            <a:ext cx="6584098" cy="5739187"/>
+          </a:xfrm>
+          <a:prstGeom prst="roundRect">
+            <a:avLst>
+              <a:gd name="adj" fmla="val 0"/>
+            </a:avLst>
+          </a:prstGeom>
+          <a:solidFill>
+            <a:srgbClr val="FFFFFF"/>
+          </a:solidFill>
+          <a:ln w="9525">
+            <a:solidFill>
+              <a:srgbClr val="C8CACA"/>
+            </a:solidFill>
+          </a:ln>
+          <a:effectLst>
+            <a:outerShdw blurRad="57150" dist="19050" dir="5400000" algn="t" rotWithShape="0">
+              <a:prstClr val="black">
+                <a:alpha val="63000"/>
+              </a:prstClr>
+            </a:outerShdw>
+          </a:effectLst>
+        </p:spPr>
+        <p:style>
+          <a:lnRef idx="2">
+            <a:schemeClr val="accent1">
+              <a:shade val="50000"/>
+            </a:schemeClr>
+          </a:lnRef>
+          <a:fillRef idx="1">
+            <a:schemeClr val="accent1"/>
+          </a:fillRef>
+          <a:effectRef idx="0">
+            <a:schemeClr val="accent1"/>
+          </a:effectRef>
+          <a:fontRef idx="minor">
+            <a:schemeClr val="lt1"/>
+          </a:fontRef>
+        </p:style>
+        <p:txBody>
+          <a:bodyPr rtlCol="0" anchor="ctr"/>
+          <a:lstStyle/>
+          <a:p>
+            <a:pPr algn="ctr"/>
+            <a:endParaRPr lang="en-US"/>
+          </a:p>
+        </p:txBody>
+      </p:sp>
+      <p:pic>
+        <p:nvPicPr>
+          <p:cNvPr id="4" name="Picture 3">
+            <a:extLst>
+              <a:ext uri="{FF2B5EF4-FFF2-40B4-BE49-F238E27FC236}">
+                <a16:creationId xmlns:a16="http://schemas.microsoft.com/office/drawing/2014/main" id="{72B5FFBF-B888-48A2-9BF6-0B69B7243CD2}"/>
+              </a:ext>
+            </a:extLst>
+          </p:cNvPr>
+          <p:cNvPicPr>
+            <a:picLocks noChangeAspect="1"/>
+          </p:cNvPicPr>
+          <p:nvPr/>
+        </p:nvPicPr>
+        <p:blipFill>
+          <a:blip r:embed="rId2"/>
+          <a:stretch>
+            <a:fillRect/>
+          </a:stretch>
+        </p:blipFill>
+        <p:spPr>
+          <a:xfrm>
+            <a:off x="5405862" y="1854827"/>
+            <a:ext cx="6019331" cy="3145100"/>
+          </a:xfrm>
+          <a:prstGeom prst="rect">
+            <a:avLst/>
+          </a:prstGeom>
+          <a:effectLst/>
+        </p:spPr>
+      </p:pic>
     </p:spTree>
     <p:extLst>
       <p:ext uri="{BB962C8B-B14F-4D97-AF65-F5344CB8AC3E}">
-        <p14:creationId xmlns:p14="http://schemas.microsoft.com/office/powerpoint/2010/main" val="1031306613"/>
+        <p14:creationId xmlns:p14="http://schemas.microsoft.com/office/powerpoint/2010/main" val="1957041346"/>
       </p:ext>
     </p:extLst>
   </p:cSld>
@@ -3677,6 +4887,227 @@
 </file>
 
 <file path=ppt/slides/slide4.xml><?xml version="1.0" encoding="utf-8"?>
+<p:sld xmlns:a="http://schemas.openxmlformats.org/drawingml/2006/main" xmlns:r="http://schemas.openxmlformats.org/officeDocument/2006/relationships" xmlns:p="http://schemas.openxmlformats.org/presentationml/2006/main">
+  <p:cSld>
+    <p:bg>
+      <p:bgPr>
+        <a:solidFill>
+          <a:schemeClr val="bg1"/>
+        </a:solidFill>
+        <a:effectLst/>
+      </p:bgPr>
+    </p:bg>
+    <p:spTree>
+      <p:nvGrpSpPr>
+        <p:cNvPr id="1" name=""/>
+        <p:cNvGrpSpPr/>
+        <p:nvPr/>
+      </p:nvGrpSpPr>
+      <p:grpSpPr>
+        <a:xfrm>
+          <a:off x="0" y="0"/>
+          <a:ext cx="0" cy="0"/>
+          <a:chOff x="0" y="0"/>
+          <a:chExt cx="0" cy="0"/>
+        </a:xfrm>
+      </p:grpSpPr>
+      <p:sp>
+        <p:nvSpPr>
+          <p:cNvPr id="21" name="Rectangle 20">
+            <a:extLst>
+              <a:ext uri="{FF2B5EF4-FFF2-40B4-BE49-F238E27FC236}">
+                <a16:creationId xmlns:a16="http://schemas.microsoft.com/office/drawing/2014/main" id="{EBF87945-A001-489F-9D9B-7D9435F0B9CA}"/>
+              </a:ext>
+              <a:ext uri="{C183D7F6-B498-43B3-948B-1728B52AA6E4}">
+                <adec:decorative xmlns:adec="http://schemas.microsoft.com/office/drawing/2017/decorative" val="1"/>
+              </a:ext>
+            </a:extLst>
+          </p:cNvPr>
+          <p:cNvSpPr>
+            <a:spLocks noGrp="1" noRot="1" noChangeAspect="1" noMove="1" noResize="1" noEditPoints="1" noAdjustHandles="1" noChangeArrowheads="1" noChangeShapeType="1" noTextEdit="1"/>
+          </p:cNvSpPr>
+          <p:nvPr>
+            <p:extLst>
+              <p:ext uri="{386F3935-93C4-4BCD-93E2-E3B085C9AB24}">
+                <p16:designElem xmlns:p16="http://schemas.microsoft.com/office/powerpoint/2015/main" val="1"/>
+              </p:ext>
+            </p:extLst>
+          </p:nvPr>
+        </p:nvSpPr>
+        <p:spPr>
+          <a:xfrm>
+            <a:off x="548639" y="347471"/>
+            <a:ext cx="11100816" cy="1801368"/>
+          </a:xfrm>
+          <a:prstGeom prst="rect">
+            <a:avLst/>
+          </a:prstGeom>
+          <a:solidFill>
+            <a:schemeClr val="tx1">
+              <a:lumMod val="75000"/>
+              <a:lumOff val="25000"/>
+            </a:schemeClr>
+          </a:solidFill>
+          <a:ln>
+            <a:noFill/>
+          </a:ln>
+        </p:spPr>
+        <p:style>
+          <a:lnRef idx="2">
+            <a:schemeClr val="accent1">
+              <a:shade val="50000"/>
+            </a:schemeClr>
+          </a:lnRef>
+          <a:fillRef idx="1">
+            <a:schemeClr val="accent1"/>
+          </a:fillRef>
+          <a:effectRef idx="0">
+            <a:schemeClr val="accent1"/>
+          </a:effectRef>
+          <a:fontRef idx="minor">
+            <a:schemeClr val="lt1"/>
+          </a:fontRef>
+        </p:style>
+        <p:txBody>
+          <a:bodyPr rtlCol="0" anchor="ctr"/>
+          <a:lstStyle/>
+          <a:p>
+            <a:pPr algn="ctr"/>
+            <a:endParaRPr lang="en-US"/>
+          </a:p>
+        </p:txBody>
+      </p:sp>
+      <p:sp>
+        <p:nvSpPr>
+          <p:cNvPr id="2" name="Title 1">
+            <a:extLst>
+              <a:ext uri="{FF2B5EF4-FFF2-40B4-BE49-F238E27FC236}">
+                <a16:creationId xmlns:a16="http://schemas.microsoft.com/office/drawing/2014/main" id="{D073BFCF-E401-41D6-9749-BF306BCF5F19}"/>
+              </a:ext>
+            </a:extLst>
+          </p:cNvPr>
+          <p:cNvSpPr>
+            <a:spLocks noGrp="1"/>
+          </p:cNvSpPr>
+          <p:nvPr>
+            <p:ph type="title"/>
+          </p:nvPr>
+        </p:nvSpPr>
+        <p:spPr>
+          <a:xfrm>
+            <a:off x="838200" y="585216"/>
+            <a:ext cx="10515600" cy="1325563"/>
+          </a:xfrm>
+        </p:spPr>
+        <p:txBody>
+          <a:bodyPr>
+            <a:normAutofit/>
+          </a:bodyPr>
+          <a:lstStyle/>
+          <a:p>
+            <a:r>
+              <a:rPr lang="en-US">
+                <a:solidFill>
+                  <a:schemeClr val="bg1"/>
+                </a:solidFill>
+              </a:rPr>
+              <a:t>Assemblies</a:t>
+            </a:r>
+            <a:endParaRPr lang="en-DK">
+              <a:solidFill>
+                <a:schemeClr val="bg1"/>
+              </a:solidFill>
+            </a:endParaRPr>
+          </a:p>
+        </p:txBody>
+      </p:sp>
+      <p:pic>
+        <p:nvPicPr>
+          <p:cNvPr id="4" name="Picture 3">
+            <a:extLst>
+              <a:ext uri="{FF2B5EF4-FFF2-40B4-BE49-F238E27FC236}">
+                <a16:creationId xmlns:a16="http://schemas.microsoft.com/office/drawing/2014/main" id="{2C5B7338-B806-430D-B888-87306F8E94E6}"/>
+              </a:ext>
+            </a:extLst>
+          </p:cNvPr>
+          <p:cNvPicPr>
+            <a:picLocks noChangeAspect="1"/>
+          </p:cNvPicPr>
+          <p:nvPr/>
+        </p:nvPicPr>
+        <p:blipFill rotWithShape="1">
+          <a:blip r:embed="rId2"/>
+          <a:srcRect r="754"/>
+          <a:stretch/>
+        </p:blipFill>
+        <p:spPr>
+          <a:xfrm>
+            <a:off x="841248" y="2516777"/>
+            <a:ext cx="6236208" cy="3660185"/>
+          </a:xfrm>
+          <a:prstGeom prst="rect">
+            <a:avLst/>
+          </a:prstGeom>
+        </p:spPr>
+      </p:pic>
+      <p:sp>
+        <p:nvSpPr>
+          <p:cNvPr id="3" name="Content Placeholder 2">
+            <a:extLst>
+              <a:ext uri="{FF2B5EF4-FFF2-40B4-BE49-F238E27FC236}">
+                <a16:creationId xmlns:a16="http://schemas.microsoft.com/office/drawing/2014/main" id="{461EA124-20F7-46E5-B8D3-E75445DBE9B9}"/>
+              </a:ext>
+            </a:extLst>
+          </p:cNvPr>
+          <p:cNvSpPr>
+            <a:spLocks noGrp="1"/>
+          </p:cNvSpPr>
+          <p:nvPr>
+            <p:ph idx="1"/>
+          </p:nvPr>
+        </p:nvSpPr>
+        <p:spPr>
+          <a:xfrm>
+            <a:off x="7546848" y="2516777"/>
+            <a:ext cx="3803904" cy="3660185"/>
+          </a:xfrm>
+        </p:spPr>
+        <p:txBody>
+          <a:bodyPr anchor="ctr">
+            <a:normAutofit/>
+          </a:bodyPr>
+          <a:lstStyle/>
+          <a:p>
+            <a:r>
+              <a:rPr lang="en-US" sz="2200"/>
+              <a:t> Som sagt skal ting I .NET ikke definers, som I COM</a:t>
+            </a:r>
+          </a:p>
+          <a:p>
+            <a:r>
+              <a:rPr lang="en-US" sz="2200"/>
+              <a:t>Alle ting bliver genereret som metadata I assembli’en, hvor manifested, kan delegere alle forventede resource og reference</a:t>
+            </a:r>
+          </a:p>
+          <a:p>
+            <a:endParaRPr lang="en-DK" sz="2200"/>
+          </a:p>
+        </p:txBody>
+      </p:sp>
+    </p:spTree>
+    <p:extLst>
+      <p:ext uri="{BB962C8B-B14F-4D97-AF65-F5344CB8AC3E}">
+        <p14:creationId xmlns:p14="http://schemas.microsoft.com/office/powerpoint/2010/main" val="1154969053"/>
+      </p:ext>
+    </p:extLst>
+  </p:cSld>
+  <p:clrMapOvr>
+    <a:masterClrMapping/>
+  </p:clrMapOvr>
+</p:sld>
+</file>
+
+<file path=ppt/slides/slide5.xml><?xml version="1.0" encoding="utf-8"?>
 <p:sld xmlns:a="http://schemas.openxmlformats.org/drawingml/2006/main" xmlns:r="http://schemas.openxmlformats.org/officeDocument/2006/relationships" xmlns:p="http://schemas.openxmlformats.org/presentationml/2006/main">
   <p:cSld>
     <p:bg>
@@ -4387,7 +5818,547 @@
 </p:sld>
 </file>
 
-<file path=ppt/slides/slide5.xml><?xml version="1.0" encoding="utf-8"?>
+<file path=ppt/slides/slide6.xml><?xml version="1.0" encoding="utf-8"?>
+<p:sld xmlns:a="http://schemas.openxmlformats.org/drawingml/2006/main" xmlns:r="http://schemas.openxmlformats.org/officeDocument/2006/relationships" xmlns:p="http://schemas.openxmlformats.org/presentationml/2006/main">
+  <p:cSld>
+    <p:bg>
+      <p:bgPr>
+        <a:solidFill>
+          <a:schemeClr val="bg1"/>
+        </a:solidFill>
+        <a:effectLst/>
+      </p:bgPr>
+    </p:bg>
+    <p:spTree>
+      <p:nvGrpSpPr>
+        <p:cNvPr id="1" name=""/>
+        <p:cNvGrpSpPr/>
+        <p:nvPr/>
+      </p:nvGrpSpPr>
+      <p:grpSpPr>
+        <a:xfrm>
+          <a:off x="0" y="0"/>
+          <a:ext cx="0" cy="0"/>
+          <a:chOff x="0" y="0"/>
+          <a:chExt cx="0" cy="0"/>
+        </a:xfrm>
+      </p:grpSpPr>
+      <p:sp>
+        <p:nvSpPr>
+          <p:cNvPr id="2" name="Titel 1">
+            <a:extLst>
+              <a:ext uri="{FF2B5EF4-FFF2-40B4-BE49-F238E27FC236}">
+                <a16:creationId xmlns:a16="http://schemas.microsoft.com/office/drawing/2014/main" id="{43126FC1-AF13-46C0-8516-F52021325E20}"/>
+              </a:ext>
+            </a:extLst>
+          </p:cNvPr>
+          <p:cNvSpPr>
+            <a:spLocks noGrp="1"/>
+          </p:cNvSpPr>
+          <p:nvPr>
+            <p:ph type="title"/>
+          </p:nvPr>
+        </p:nvSpPr>
+        <p:spPr>
+          <a:xfrm>
+            <a:off x="648929" y="629266"/>
+            <a:ext cx="4944152" cy="1622321"/>
+          </a:xfrm>
+        </p:spPr>
+        <p:txBody>
+          <a:bodyPr>
+            <a:normAutofit/>
+          </a:bodyPr>
+          <a:lstStyle/>
+          <a:p>
+            <a:r>
+              <a:rPr lang="en-US" dirty="0"/>
+              <a:t>Assembly naming</a:t>
+            </a:r>
+            <a:endParaRPr lang="en-DK" dirty="0"/>
+          </a:p>
+        </p:txBody>
+      </p:sp>
+      <p:sp>
+        <p:nvSpPr>
+          <p:cNvPr id="3" name="Pladsholder til indhold 2">
+            <a:extLst>
+              <a:ext uri="{FF2B5EF4-FFF2-40B4-BE49-F238E27FC236}">
+                <a16:creationId xmlns:a16="http://schemas.microsoft.com/office/drawing/2014/main" id="{27203018-6F11-486A-AD54-5963005FFF81}"/>
+              </a:ext>
+            </a:extLst>
+          </p:cNvPr>
+          <p:cNvSpPr>
+            <a:spLocks noGrp="1"/>
+          </p:cNvSpPr>
+          <p:nvPr>
+            <p:ph idx="1"/>
+          </p:nvPr>
+        </p:nvSpPr>
+        <p:spPr>
+          <a:xfrm>
+            <a:off x="648930" y="2438400"/>
+            <a:ext cx="4944151" cy="3785419"/>
+          </a:xfrm>
+        </p:spPr>
+        <p:txBody>
+          <a:bodyPr>
+            <a:normAutofit fontScale="92500" lnSpcReduction="20000"/>
+          </a:bodyPr>
+          <a:lstStyle/>
+          <a:p>
+            <a:r>
+              <a:rPr lang="en-US" sz="2400" dirty="0"/>
+              <a:t>Man </a:t>
+            </a:r>
+            <a:r>
+              <a:rPr lang="en-US" sz="2400" dirty="0" err="1"/>
+              <a:t>skal</a:t>
+            </a:r>
+            <a:r>
+              <a:rPr lang="en-US" sz="2400" dirty="0"/>
+              <a:t> </a:t>
+            </a:r>
+            <a:r>
+              <a:rPr lang="en-US" sz="2400" dirty="0" err="1"/>
+              <a:t>være</a:t>
+            </a:r>
+            <a:r>
+              <a:rPr lang="en-US" sz="2400" dirty="0"/>
+              <a:t> </a:t>
+            </a:r>
+            <a:r>
+              <a:rPr lang="en-US" sz="2400" dirty="0" err="1"/>
+              <a:t>opmærksom</a:t>
+            </a:r>
+            <a:r>
+              <a:rPr lang="en-US" sz="2400" dirty="0"/>
+              <a:t> </a:t>
+            </a:r>
+            <a:r>
+              <a:rPr lang="en-US" sz="2400" dirty="0" err="1"/>
+              <a:t>på</a:t>
+            </a:r>
+            <a:r>
+              <a:rPr lang="en-US" sz="2400" dirty="0"/>
+              <a:t> </a:t>
+            </a:r>
+            <a:r>
+              <a:rPr lang="en-US" sz="2400" dirty="0" err="1"/>
+              <a:t>på</a:t>
+            </a:r>
+            <a:r>
+              <a:rPr lang="en-US" sz="2400" dirty="0"/>
+              <a:t> to slags </a:t>
+            </a:r>
+            <a:r>
+              <a:rPr lang="en-US" sz="2400" dirty="0" err="1"/>
+              <a:t>navne</a:t>
+            </a:r>
+            <a:r>
+              <a:rPr lang="en-US" sz="2400" dirty="0"/>
+              <a:t> </a:t>
+            </a:r>
+            <a:r>
+              <a:rPr lang="en-US" sz="2400" dirty="0" err="1"/>
+              <a:t>inden</a:t>
+            </a:r>
+            <a:r>
+              <a:rPr lang="en-US" sz="2400" dirty="0"/>
+              <a:t> for .NET </a:t>
+            </a:r>
+            <a:r>
+              <a:rPr lang="en-US" sz="2400" dirty="0" err="1"/>
+              <a:t>komponenter</a:t>
+            </a:r>
+            <a:endParaRPr lang="en-US" sz="2400" dirty="0"/>
+          </a:p>
+          <a:p>
+            <a:r>
+              <a:rPr lang="en-US" sz="2400" dirty="0"/>
+              <a:t>Assembly </a:t>
+            </a:r>
+            <a:r>
+              <a:rPr lang="en-US" sz="2400" dirty="0" err="1"/>
+              <a:t>strongnames</a:t>
+            </a:r>
+            <a:r>
+              <a:rPr lang="en-US" sz="2400" dirty="0"/>
+              <a:t> </a:t>
+            </a:r>
+            <a:r>
+              <a:rPr lang="en-US" sz="2400" dirty="0" err="1"/>
+              <a:t>og</a:t>
+            </a:r>
+            <a:r>
+              <a:rPr lang="en-US" sz="2400" dirty="0"/>
+              <a:t> Namespaces</a:t>
+            </a:r>
+          </a:p>
+          <a:p>
+            <a:r>
+              <a:rPr lang="en-US" sz="2400" dirty="0"/>
+              <a:t>Assembly </a:t>
+            </a:r>
+            <a:r>
+              <a:rPr lang="en-US" sz="2400" dirty="0" err="1"/>
+              <a:t>strongnames</a:t>
+            </a:r>
+            <a:r>
+              <a:rPr lang="en-US" sz="2400" dirty="0"/>
+              <a:t> </a:t>
+            </a:r>
+            <a:r>
+              <a:rPr lang="en-US" sz="2400" dirty="0" err="1"/>
+              <a:t>bruges</a:t>
+            </a:r>
+            <a:r>
+              <a:rPr lang="en-US" sz="2400" dirty="0"/>
+              <a:t> </a:t>
+            </a:r>
+            <a:r>
+              <a:rPr lang="en-US" sz="2400" dirty="0" err="1"/>
+              <a:t>når</a:t>
+            </a:r>
+            <a:r>
+              <a:rPr lang="en-US" sz="2400" dirty="0"/>
+              <a:t> der </a:t>
+            </a:r>
+            <a:r>
+              <a:rPr lang="en-US" sz="2400" dirty="0" err="1"/>
+              <a:t>er</a:t>
+            </a:r>
+            <a:r>
+              <a:rPr lang="en-US" sz="2400" dirty="0"/>
+              <a:t> tale om det </a:t>
+            </a:r>
+            <a:r>
+              <a:rPr lang="en-US" sz="2400" dirty="0" err="1"/>
+              <a:t>fysiske</a:t>
+            </a:r>
+            <a:r>
+              <a:rPr lang="en-US" sz="2400" dirty="0"/>
+              <a:t> view. </a:t>
+            </a:r>
+            <a:r>
+              <a:rPr lang="en-US" sz="2400" dirty="0" err="1"/>
+              <a:t>Opdelt</a:t>
+            </a:r>
+            <a:r>
+              <a:rPr lang="en-US" sz="2400" dirty="0"/>
+              <a:t> I 4 dele: </a:t>
+            </a:r>
+            <a:r>
+              <a:rPr lang="en-US" sz="2400" dirty="0" err="1"/>
+              <a:t>Friendlyname</a:t>
+            </a:r>
+            <a:r>
+              <a:rPr lang="en-US" sz="2400" dirty="0"/>
+              <a:t>, Version, Culture </a:t>
+            </a:r>
+            <a:r>
+              <a:rPr lang="en-US" sz="2400" dirty="0" err="1"/>
+              <a:t>og</a:t>
+            </a:r>
+            <a:r>
+              <a:rPr lang="en-US" sz="2400" dirty="0"/>
+              <a:t> </a:t>
+            </a:r>
+            <a:r>
+              <a:rPr lang="en-US" sz="2400" dirty="0" err="1"/>
+              <a:t>publickKeyToken</a:t>
+            </a:r>
+            <a:r>
+              <a:rPr lang="en-US" sz="2400" dirty="0"/>
+              <a:t>. Assemblies med same </a:t>
+            </a:r>
+            <a:r>
+              <a:rPr lang="en-US" sz="2400" dirty="0" err="1"/>
+              <a:t>strongname</a:t>
+            </a:r>
+            <a:r>
+              <a:rPr lang="en-US" sz="2400" dirty="0"/>
+              <a:t> </a:t>
+            </a:r>
+            <a:r>
+              <a:rPr lang="en-US" sz="2400" dirty="0" err="1"/>
+              <a:t>forventes</a:t>
+            </a:r>
+            <a:r>
+              <a:rPr lang="en-US" sz="2400" dirty="0"/>
+              <a:t> at </a:t>
+            </a:r>
+            <a:r>
+              <a:rPr lang="en-US" sz="2400" dirty="0" err="1"/>
+              <a:t>være</a:t>
+            </a:r>
+            <a:r>
+              <a:rPr lang="en-US" sz="2400" dirty="0"/>
+              <a:t> </a:t>
+            </a:r>
+            <a:r>
+              <a:rPr lang="en-US" sz="2400" dirty="0" err="1"/>
+              <a:t>ens</a:t>
+            </a:r>
+            <a:endParaRPr lang="en-US" sz="2400" dirty="0"/>
+          </a:p>
+          <a:p>
+            <a:r>
+              <a:rPr lang="en-US" sz="2400" dirty="0"/>
+              <a:t>Namespaces </a:t>
+            </a:r>
+            <a:r>
+              <a:rPr lang="en-US" sz="2400" dirty="0" err="1"/>
+              <a:t>bruges</a:t>
+            </a:r>
+            <a:r>
+              <a:rPr lang="en-US" sz="2400" dirty="0"/>
+              <a:t> </a:t>
+            </a:r>
+            <a:r>
+              <a:rPr lang="en-US" sz="2400" dirty="0" err="1"/>
+              <a:t>når</a:t>
+            </a:r>
+            <a:r>
+              <a:rPr lang="en-US" sz="2400" dirty="0"/>
+              <a:t> der </a:t>
+            </a:r>
+            <a:r>
+              <a:rPr lang="en-US" sz="2400" dirty="0" err="1"/>
+              <a:t>er</a:t>
+            </a:r>
+            <a:r>
+              <a:rPr lang="en-US" sz="2400" dirty="0"/>
+              <a:t> tale om det </a:t>
+            </a:r>
+            <a:r>
+              <a:rPr lang="en-US" sz="2400" dirty="0" err="1"/>
+              <a:t>logiske</a:t>
+            </a:r>
+            <a:r>
+              <a:rPr lang="en-US" sz="2400" dirty="0"/>
+              <a:t> view</a:t>
+            </a:r>
+          </a:p>
+          <a:p>
+            <a:r>
+              <a:rPr lang="en-US" sz="2400" dirty="0"/>
+              <a:t>To assemblies med </a:t>
+            </a:r>
+            <a:r>
+              <a:rPr lang="en-US" sz="2400" dirty="0" err="1"/>
+              <a:t>samme</a:t>
+            </a:r>
+            <a:r>
+              <a:rPr lang="en-US" sz="2400" dirty="0"/>
+              <a:t> namespace </a:t>
+            </a:r>
+            <a:r>
+              <a:rPr lang="en-US" sz="2400" dirty="0" err="1"/>
+              <a:t>skaber</a:t>
+            </a:r>
+            <a:r>
+              <a:rPr lang="en-US" sz="2400" dirty="0"/>
+              <a:t> </a:t>
+            </a:r>
+            <a:r>
+              <a:rPr lang="en-US" sz="2400" dirty="0" err="1"/>
+              <a:t>ikke</a:t>
+            </a:r>
+            <a:r>
+              <a:rPr lang="en-US" sz="2400" dirty="0"/>
+              <a:t> </a:t>
+            </a:r>
+            <a:r>
+              <a:rPr lang="en-US" sz="2400" dirty="0" err="1"/>
+              <a:t>konflikt</a:t>
+            </a:r>
+            <a:endParaRPr lang="en-DK" sz="2400" dirty="0"/>
+          </a:p>
+        </p:txBody>
+      </p:sp>
+      <p:sp>
+        <p:nvSpPr>
+          <p:cNvPr id="9" name="Rectangle 8">
+            <a:extLst>
+              <a:ext uri="{FF2B5EF4-FFF2-40B4-BE49-F238E27FC236}">
+                <a16:creationId xmlns:a16="http://schemas.microsoft.com/office/drawing/2014/main" id="{46F7435D-E3DB-47B1-BA61-B00ACC83A9DE}"/>
+              </a:ext>
+              <a:ext uri="{C183D7F6-B498-43B3-948B-1728B52AA6E4}">
+                <adec:decorative xmlns:adec="http://schemas.microsoft.com/office/drawing/2017/decorative" val="1"/>
+              </a:ext>
+            </a:extLst>
+          </p:cNvPr>
+          <p:cNvSpPr>
+            <a:spLocks noGrp="1" noRot="1" noChangeAspect="1" noMove="1" noResize="1" noEditPoints="1" noAdjustHandles="1" noChangeArrowheads="1" noChangeShapeType="1" noTextEdit="1"/>
+          </p:cNvSpPr>
+          <p:nvPr>
+            <p:extLst>
+              <p:ext uri="{386F3935-93C4-4BCD-93E2-E3B085C9AB24}">
+                <p16:designElem xmlns:p16="http://schemas.microsoft.com/office/powerpoint/2015/main" val="1"/>
+              </p:ext>
+            </p:extLst>
+          </p:nvPr>
+        </p:nvSpPr>
+        <p:spPr>
+          <a:xfrm>
+            <a:off x="6092950" y="0"/>
+            <a:ext cx="6099050" cy="6858000"/>
+          </a:xfrm>
+          <a:prstGeom prst="rect">
+            <a:avLst/>
+          </a:prstGeom>
+          <a:solidFill>
+            <a:srgbClr val="C8CACA"/>
+          </a:solidFill>
+          <a:ln>
+            <a:noFill/>
+          </a:ln>
+        </p:spPr>
+        <p:style>
+          <a:lnRef idx="2">
+            <a:schemeClr val="accent1">
+              <a:shade val="50000"/>
+            </a:schemeClr>
+          </a:lnRef>
+          <a:fillRef idx="1">
+            <a:schemeClr val="accent1"/>
+          </a:fillRef>
+          <a:effectRef idx="0">
+            <a:schemeClr val="accent1"/>
+          </a:effectRef>
+          <a:fontRef idx="minor">
+            <a:schemeClr val="lt1"/>
+          </a:fontRef>
+        </p:style>
+        <p:txBody>
+          <a:bodyPr rtlCol="0" anchor="ctr"/>
+          <a:lstStyle/>
+          <a:p>
+            <a:pPr algn="ctr"/>
+            <a:endParaRPr lang="en-US"/>
+          </a:p>
+        </p:txBody>
+      </p:sp>
+      <p:sp>
+        <p:nvSpPr>
+          <p:cNvPr id="11" name="Rounded Rectangle 9">
+            <a:extLst>
+              <a:ext uri="{FF2B5EF4-FFF2-40B4-BE49-F238E27FC236}">
+                <a16:creationId xmlns:a16="http://schemas.microsoft.com/office/drawing/2014/main" id="{F263A0B5-F8C4-4116-809F-78A768EA79A6}"/>
+              </a:ext>
+              <a:ext uri="{C183D7F6-B498-43B3-948B-1728B52AA6E4}">
+                <adec:decorative xmlns:adec="http://schemas.microsoft.com/office/drawing/2017/decorative" val="1"/>
+              </a:ext>
+            </a:extLst>
+          </p:cNvPr>
+          <p:cNvSpPr>
+            <a:spLocks noGrp="1" noRot="1" noChangeAspect="1" noMove="1" noResize="1" noEditPoints="1" noAdjustHandles="1" noChangeArrowheads="1" noChangeShapeType="1" noTextEdit="1"/>
+          </p:cNvSpPr>
+          <p:nvPr>
+            <p:extLst>
+              <p:ext uri="{386F3935-93C4-4BCD-93E2-E3B085C9AB24}">
+                <p16:designElem xmlns:p16="http://schemas.microsoft.com/office/powerpoint/2015/main" val="1"/>
+              </p:ext>
+            </p:extLst>
+          </p:nvPr>
+        </p:nvSpPr>
+        <p:spPr>
+          <a:xfrm>
+            <a:off x="6577582" y="557784"/>
+            <a:ext cx="5130204" cy="5739187"/>
+          </a:xfrm>
+          <a:prstGeom prst="roundRect">
+            <a:avLst>
+              <a:gd name="adj" fmla="val 0"/>
+            </a:avLst>
+          </a:prstGeom>
+          <a:solidFill>
+            <a:srgbClr val="FFFFFF"/>
+          </a:solidFill>
+          <a:ln w="9525">
+            <a:solidFill>
+              <a:srgbClr val="C8CACA"/>
+            </a:solidFill>
+          </a:ln>
+          <a:effectLst>
+            <a:outerShdw blurRad="57150" dist="19050" dir="5400000" algn="t" rotWithShape="0">
+              <a:prstClr val="black">
+                <a:alpha val="63000"/>
+              </a:prstClr>
+            </a:outerShdw>
+          </a:effectLst>
+        </p:spPr>
+        <p:style>
+          <a:lnRef idx="2">
+            <a:schemeClr val="accent1">
+              <a:shade val="50000"/>
+            </a:schemeClr>
+          </a:lnRef>
+          <a:fillRef idx="1">
+            <a:schemeClr val="accent1"/>
+          </a:fillRef>
+          <a:effectRef idx="0">
+            <a:schemeClr val="accent1"/>
+          </a:effectRef>
+          <a:fontRef idx="minor">
+            <a:schemeClr val="lt1"/>
+          </a:fontRef>
+        </p:style>
+        <p:txBody>
+          <a:bodyPr rtlCol="0" anchor="ctr"/>
+          <a:lstStyle/>
+          <a:p>
+            <a:pPr algn="ctr"/>
+            <a:endParaRPr lang="en-US"/>
+          </a:p>
+        </p:txBody>
+      </p:sp>
+      <p:pic>
+        <p:nvPicPr>
+          <p:cNvPr id="4" name="Picture 3">
+            <a:extLst>
+              <a:ext uri="{FF2B5EF4-FFF2-40B4-BE49-F238E27FC236}">
+                <a16:creationId xmlns:a16="http://schemas.microsoft.com/office/drawing/2014/main" id="{4963FA4B-E904-4147-B7E8-3E7B9EB5A551}"/>
+              </a:ext>
+            </a:extLst>
+          </p:cNvPr>
+          <p:cNvPicPr>
+            <a:picLocks noChangeAspect="1"/>
+          </p:cNvPicPr>
+          <p:nvPr/>
+        </p:nvPicPr>
+        <p:blipFill>
+          <a:blip r:embed="rId2"/>
+          <a:stretch>
+            <a:fillRect/>
+          </a:stretch>
+        </p:blipFill>
+        <p:spPr>
+          <a:xfrm>
+            <a:off x="7404523" y="833418"/>
+            <a:ext cx="3475903" cy="5187917"/>
+          </a:xfrm>
+          <a:prstGeom prst="rect">
+            <a:avLst/>
+          </a:prstGeom>
+          <a:effectLst/>
+        </p:spPr>
+      </p:pic>
+    </p:spTree>
+    <p:extLst>
+      <p:ext uri="{BB962C8B-B14F-4D97-AF65-F5344CB8AC3E}">
+        <p14:creationId xmlns:p14="http://schemas.microsoft.com/office/powerpoint/2010/main" val="1425229081"/>
+      </p:ext>
+    </p:extLst>
+  </p:cSld>
+  <p:clrMapOvr>
+    <a:masterClrMapping/>
+  </p:clrMapOvr>
+</p:sld>
+</file>
+
+<file path=ppt/slides/slide7.xml><?xml version="1.0" encoding="utf-8"?>
 <p:sld xmlns:a="http://schemas.openxmlformats.org/drawingml/2006/main" xmlns:r="http://schemas.openxmlformats.org/officeDocument/2006/relationships" xmlns:p="http://schemas.openxmlformats.org/presentationml/2006/main">
   <p:cSld>
     <p:spTree>
@@ -4497,7 +6468,321 @@
           <a:bodyPr/>
           <a:lstStyle/>
           <a:p>
-            <a:endParaRPr lang="en-DK"/>
+            <a:r>
+              <a:rPr lang="en-US" dirty="0" err="1"/>
+              <a:t>Derfor</a:t>
+            </a:r>
+            <a:r>
+              <a:rPr lang="en-US" dirty="0"/>
+              <a:t> </a:t>
+            </a:r>
+            <a:r>
+              <a:rPr lang="en-US" dirty="0" err="1"/>
+              <a:t>kan</a:t>
+            </a:r>
+            <a:r>
+              <a:rPr lang="en-US" dirty="0"/>
+              <a:t> </a:t>
+            </a:r>
+            <a:r>
+              <a:rPr lang="en-US" dirty="0" err="1"/>
+              <a:t>versionering</a:t>
+            </a:r>
+            <a:r>
+              <a:rPr lang="en-US" dirty="0"/>
+              <a:t> </a:t>
+            </a:r>
+            <a:r>
+              <a:rPr lang="en-US" dirty="0" err="1"/>
+              <a:t>udfra</a:t>
+            </a:r>
+            <a:r>
+              <a:rPr lang="en-US" dirty="0"/>
+              <a:t> </a:t>
+            </a:r>
+            <a:r>
+              <a:rPr lang="en-US" dirty="0" err="1"/>
+              <a:t>strongnames</a:t>
+            </a:r>
+            <a:r>
+              <a:rPr lang="en-US" dirty="0"/>
+              <a:t> vide om der </a:t>
+            </a:r>
+            <a:r>
+              <a:rPr lang="en-US" dirty="0" err="1"/>
+              <a:t>er</a:t>
+            </a:r>
+            <a:r>
+              <a:rPr lang="en-US" dirty="0"/>
+              <a:t> tale om </a:t>
+            </a:r>
+            <a:r>
+              <a:rPr lang="en-US" dirty="0" err="1"/>
+              <a:t>en</a:t>
+            </a:r>
+            <a:r>
+              <a:rPr lang="en-US" dirty="0"/>
+              <a:t> </a:t>
+            </a:r>
+            <a:r>
+              <a:rPr lang="en-US" dirty="0" err="1"/>
+              <a:t>ny</a:t>
+            </a:r>
+            <a:r>
+              <a:rPr lang="en-US" dirty="0"/>
+              <a:t> version </a:t>
+            </a:r>
+            <a:r>
+              <a:rPr lang="en-US" dirty="0" err="1"/>
+              <a:t>eller</a:t>
+            </a:r>
+            <a:r>
+              <a:rPr lang="en-US" dirty="0"/>
+              <a:t> </a:t>
+            </a:r>
+            <a:r>
+              <a:rPr lang="en-US" dirty="0" err="1"/>
+              <a:t>ej</a:t>
+            </a:r>
+            <a:r>
+              <a:rPr lang="en-US" dirty="0"/>
+              <a:t>.</a:t>
+            </a:r>
+          </a:p>
+          <a:p>
+            <a:r>
+              <a:rPr lang="en-US" dirty="0"/>
+              <a:t>Det </a:t>
+            </a:r>
+            <a:r>
+              <a:rPr lang="en-US" dirty="0" err="1"/>
+              <a:t>er</a:t>
+            </a:r>
+            <a:r>
+              <a:rPr lang="en-US" dirty="0"/>
+              <a:t> </a:t>
+            </a:r>
+            <a:r>
+              <a:rPr lang="en-US" dirty="0" err="1"/>
+              <a:t>vigtigt</a:t>
+            </a:r>
+            <a:r>
+              <a:rPr lang="en-US" dirty="0"/>
+              <a:t> at </a:t>
+            </a:r>
+            <a:r>
+              <a:rPr lang="en-US" dirty="0" err="1"/>
+              <a:t>huske</a:t>
+            </a:r>
+            <a:r>
+              <a:rPr lang="en-US" dirty="0"/>
+              <a:t> at </a:t>
+            </a:r>
+            <a:r>
+              <a:rPr lang="en-US" dirty="0" err="1"/>
+              <a:t>versionere</a:t>
+            </a:r>
+            <a:r>
+              <a:rPr lang="en-US" dirty="0"/>
+              <a:t> assemblies med </a:t>
+            </a:r>
+            <a:r>
+              <a:rPr lang="en-US" dirty="0" err="1"/>
+              <a:t>strongnames</a:t>
+            </a:r>
+            <a:r>
+              <a:rPr lang="en-US" dirty="0"/>
+              <a:t> da det </a:t>
+            </a:r>
+            <a:r>
+              <a:rPr lang="en-US" dirty="0" err="1"/>
+              <a:t>er</a:t>
+            </a:r>
+            <a:r>
+              <a:rPr lang="en-US" dirty="0"/>
+              <a:t> den </a:t>
+            </a:r>
+            <a:r>
+              <a:rPr lang="en-US" dirty="0" err="1"/>
+              <a:t>eneste</a:t>
+            </a:r>
+            <a:r>
+              <a:rPr lang="en-US" dirty="0"/>
+              <a:t> </a:t>
+            </a:r>
+            <a:r>
+              <a:rPr lang="en-US" dirty="0" err="1"/>
+              <a:t>måde</a:t>
+            </a:r>
+            <a:r>
+              <a:rPr lang="en-US" dirty="0"/>
+              <a:t> at </a:t>
+            </a:r>
+            <a:r>
+              <a:rPr lang="en-US" dirty="0" err="1"/>
+              <a:t>finde</a:t>
+            </a:r>
+            <a:r>
+              <a:rPr lang="en-US" dirty="0"/>
+              <a:t> </a:t>
+            </a:r>
+            <a:r>
+              <a:rPr lang="en-US" dirty="0" err="1"/>
+              <a:t>andre</a:t>
+            </a:r>
+            <a:r>
+              <a:rPr lang="en-US" dirty="0"/>
+              <a:t> assemblies </a:t>
+            </a:r>
+            <a:r>
+              <a:rPr lang="en-US" dirty="0" err="1"/>
+              <a:t>på</a:t>
+            </a:r>
+            <a:r>
+              <a:rPr lang="en-US" dirty="0"/>
+              <a:t>.</a:t>
+            </a:r>
+          </a:p>
+          <a:p>
+            <a:r>
+              <a:rPr lang="en-US" dirty="0"/>
+              <a:t>I det </a:t>
+            </a:r>
+            <a:r>
+              <a:rPr lang="en-US" dirty="0" err="1"/>
+              <a:t>tilfælde</a:t>
+            </a:r>
+            <a:r>
+              <a:rPr lang="en-US" dirty="0"/>
+              <a:t> at der </a:t>
+            </a:r>
+            <a:r>
+              <a:rPr lang="en-US" dirty="0" err="1"/>
+              <a:t>kommer</a:t>
+            </a:r>
+            <a:r>
+              <a:rPr lang="en-US" dirty="0"/>
+              <a:t> </a:t>
+            </a:r>
+            <a:r>
+              <a:rPr lang="en-US" dirty="0" err="1"/>
+              <a:t>opdateringer</a:t>
+            </a:r>
+            <a:r>
+              <a:rPr lang="en-US" dirty="0"/>
+              <a:t> I </a:t>
+            </a:r>
+            <a:r>
+              <a:rPr lang="en-US" dirty="0" err="1"/>
+              <a:t>softwaren</a:t>
+            </a:r>
+            <a:r>
+              <a:rPr lang="en-US" dirty="0"/>
+              <a:t>, </a:t>
+            </a:r>
+            <a:r>
+              <a:rPr lang="en-US" dirty="0" err="1"/>
+              <a:t>kan</a:t>
+            </a:r>
+            <a:r>
+              <a:rPr lang="en-US" dirty="0"/>
+              <a:t> der laves </a:t>
+            </a:r>
+            <a:r>
+              <a:rPr lang="en-US" dirty="0" err="1"/>
+              <a:t>en</a:t>
+            </a:r>
+            <a:r>
+              <a:rPr lang="en-US" dirty="0"/>
+              <a:t> </a:t>
+            </a:r>
+            <a:r>
+              <a:rPr lang="en-US" dirty="0" err="1"/>
+              <a:t>brugerdefineret</a:t>
+            </a:r>
+            <a:r>
+              <a:rPr lang="en-US" dirty="0"/>
+              <a:t> </a:t>
+            </a:r>
+            <a:r>
+              <a:rPr lang="en-US" dirty="0" err="1"/>
+              <a:t>versionerings</a:t>
+            </a:r>
+            <a:r>
+              <a:rPr lang="en-US" dirty="0"/>
+              <a:t> </a:t>
+            </a:r>
+            <a:r>
+              <a:rPr lang="en-US" dirty="0" err="1"/>
+              <a:t>politik</a:t>
+            </a:r>
+            <a:endParaRPr lang="en-US" dirty="0"/>
+          </a:p>
+          <a:p>
+            <a:pPr lvl="1"/>
+            <a:r>
+              <a:rPr lang="en-US" dirty="0"/>
+              <a:t>Det </a:t>
+            </a:r>
+            <a:r>
+              <a:rPr lang="en-US" dirty="0" err="1"/>
+              <a:t>ville</a:t>
+            </a:r>
+            <a:r>
+              <a:rPr lang="en-US" dirty="0"/>
+              <a:t> bare </a:t>
+            </a:r>
+            <a:r>
+              <a:rPr lang="en-US" dirty="0" err="1"/>
+              <a:t>være</a:t>
+            </a:r>
+            <a:r>
+              <a:rPr lang="en-US" dirty="0"/>
+              <a:t> </a:t>
+            </a:r>
+            <a:r>
+              <a:rPr lang="en-US" dirty="0" err="1"/>
+              <a:t>en</a:t>
+            </a:r>
+            <a:r>
+              <a:rPr lang="en-US" dirty="0"/>
+              <a:t> XML fil der </a:t>
+            </a:r>
+            <a:r>
+              <a:rPr lang="en-US" dirty="0" err="1"/>
+              <a:t>forspørger</a:t>
+            </a:r>
+            <a:r>
+              <a:rPr lang="en-US" dirty="0"/>
+              <a:t> </a:t>
+            </a:r>
+            <a:r>
+              <a:rPr lang="en-US" dirty="0" err="1"/>
+              <a:t>efter</a:t>
+            </a:r>
+            <a:r>
+              <a:rPr lang="en-US" dirty="0"/>
+              <a:t> </a:t>
+            </a:r>
+            <a:r>
+              <a:rPr lang="en-US" dirty="0" err="1"/>
+              <a:t>en</a:t>
+            </a:r>
+            <a:r>
+              <a:rPr lang="en-US" dirty="0"/>
+              <a:t> </a:t>
+            </a:r>
+            <a:r>
+              <a:rPr lang="en-US" dirty="0" err="1"/>
+              <a:t>opdateret</a:t>
+            </a:r>
+            <a:r>
+              <a:rPr lang="en-US" dirty="0"/>
+              <a:t> assembly</a:t>
+            </a:r>
+          </a:p>
+          <a:p>
+            <a:endParaRPr lang="en-US" dirty="0"/>
           </a:p>
         </p:txBody>
       </p:sp>
@@ -4514,7 +6799,7 @@
 </p:sld>
 </file>
 
-<file path=ppt/slides/slide6.xml><?xml version="1.0" encoding="utf-8"?>
+<file path=ppt/slides/slide8.xml><?xml version="1.0" encoding="utf-8"?>
 <p:sld xmlns:a="http://schemas.openxmlformats.org/drawingml/2006/main" xmlns:r="http://schemas.openxmlformats.org/officeDocument/2006/relationships" xmlns:p="http://schemas.openxmlformats.org/presentationml/2006/main">
   <p:cSld>
     <p:spTree>
@@ -4533,10 +6818,10 @@
       </p:grpSpPr>
       <p:sp>
         <p:nvSpPr>
-          <p:cNvPr id="2" name="Titel 1">
-            <a:extLst>
-              <a:ext uri="{FF2B5EF4-FFF2-40B4-BE49-F238E27FC236}">
-                <a16:creationId xmlns:a16="http://schemas.microsoft.com/office/drawing/2014/main" id="{43126FC1-AF13-46C0-8516-F52021325E20}"/>
+          <p:cNvPr id="2" name="Title 1">
+            <a:extLst>
+              <a:ext uri="{FF2B5EF4-FFF2-40B4-BE49-F238E27FC236}">
+                <a16:creationId xmlns:a16="http://schemas.microsoft.com/office/drawing/2014/main" id="{710E182D-CB16-42B8-8677-43B5EFB13A5E}"/>
               </a:ext>
             </a:extLst>
           </p:cNvPr>
@@ -4552,16 +6837,20 @@
           <a:bodyPr/>
           <a:lstStyle/>
           <a:p>
-            <a:endParaRPr lang="en-DK"/>
-          </a:p>
-        </p:txBody>
-      </p:sp>
-      <p:sp>
-        <p:nvSpPr>
-          <p:cNvPr id="3" name="Pladsholder til indhold 2">
-            <a:extLst>
-              <a:ext uri="{FF2B5EF4-FFF2-40B4-BE49-F238E27FC236}">
-                <a16:creationId xmlns:a16="http://schemas.microsoft.com/office/drawing/2014/main" id="{27203018-6F11-486A-AD54-5963005FFF81}"/>
+            <a:r>
+              <a:rPr lang="en-US" dirty="0"/>
+              <a:t>Linking</a:t>
+            </a:r>
+            <a:endParaRPr lang="en-DK" dirty="0"/>
+          </a:p>
+        </p:txBody>
+      </p:sp>
+      <p:sp>
+        <p:nvSpPr>
+          <p:cNvPr id="3" name="Content Placeholder 2">
+            <a:extLst>
+              <a:ext uri="{FF2B5EF4-FFF2-40B4-BE49-F238E27FC236}">
+                <a16:creationId xmlns:a16="http://schemas.microsoft.com/office/drawing/2014/main" id="{2873952C-2C3E-45A1-8658-AB9BB5C5AB5D}"/>
               </a:ext>
             </a:extLst>
           </p:cNvPr>
@@ -4577,14 +6866,235 @@
           <a:bodyPr/>
           <a:lstStyle/>
           <a:p>
-            <a:endParaRPr lang="en-DK"/>
+            <a:r>
+              <a:rPr lang="en-US" dirty="0"/>
+              <a:t>I .NET </a:t>
+            </a:r>
+            <a:r>
+              <a:rPr lang="en-US" dirty="0" err="1"/>
+              <a:t>kan</a:t>
+            </a:r>
+            <a:r>
+              <a:rPr lang="en-US" dirty="0"/>
+              <a:t> der </a:t>
+            </a:r>
+            <a:r>
+              <a:rPr lang="en-US" dirty="0" err="1"/>
+              <a:t>ikke</a:t>
+            </a:r>
+            <a:r>
+              <a:rPr lang="en-US" dirty="0"/>
+              <a:t> </a:t>
+            </a:r>
+            <a:r>
+              <a:rPr lang="en-US" dirty="0" err="1"/>
+              <a:t>ske</a:t>
+            </a:r>
+            <a:r>
+              <a:rPr lang="en-US" dirty="0"/>
+              <a:t> </a:t>
+            </a:r>
+            <a:r>
+              <a:rPr lang="en-US" dirty="0" err="1"/>
+              <a:t>statisk</a:t>
+            </a:r>
+            <a:r>
+              <a:rPr lang="en-US" dirty="0"/>
+              <a:t> linking</a:t>
+            </a:r>
+          </a:p>
+          <a:p>
+            <a:r>
+              <a:rPr lang="en-US" dirty="0"/>
+              <a:t>Der </a:t>
+            </a:r>
+            <a:r>
+              <a:rPr lang="en-US" dirty="0" err="1"/>
+              <a:t>er</a:t>
+            </a:r>
+            <a:r>
+              <a:rPr lang="en-US" dirty="0"/>
+              <a:t> </a:t>
+            </a:r>
+            <a:r>
+              <a:rPr lang="en-US" dirty="0" err="1"/>
+              <a:t>kun</a:t>
+            </a:r>
+            <a:r>
+              <a:rPr lang="en-US" dirty="0"/>
+              <a:t> </a:t>
+            </a:r>
+            <a:r>
+              <a:rPr lang="en-US" dirty="0" err="1"/>
+              <a:t>mulighed</a:t>
+            </a:r>
+            <a:r>
+              <a:rPr lang="en-US" dirty="0"/>
+              <a:t> for </a:t>
+            </a:r>
+            <a:r>
+              <a:rPr lang="en-US" dirty="0" err="1"/>
+              <a:t>dynamisk</a:t>
+            </a:r>
+            <a:endParaRPr lang="en-US" dirty="0"/>
+          </a:p>
+          <a:p>
+            <a:pPr lvl="1"/>
+            <a:r>
+              <a:rPr lang="en-US" dirty="0"/>
+              <a:t>I form </a:t>
+            </a:r>
+            <a:r>
+              <a:rPr lang="en-US" dirty="0" err="1"/>
+              <a:t>af</a:t>
+            </a:r>
+            <a:r>
+              <a:rPr lang="en-US" dirty="0"/>
+              <a:t> </a:t>
+            </a:r>
+            <a:r>
+              <a:rPr lang="en-US" dirty="0" err="1"/>
+              <a:t>loadtime</a:t>
+            </a:r>
+            <a:r>
+              <a:rPr lang="en-US" dirty="0"/>
+              <a:t> linking </a:t>
+            </a:r>
+            <a:r>
+              <a:rPr lang="en-US" dirty="0" err="1"/>
+              <a:t>eller</a:t>
+            </a:r>
+            <a:r>
+              <a:rPr lang="en-US" dirty="0"/>
+              <a:t> runtime linking  </a:t>
+            </a:r>
+            <a:endParaRPr lang="en-DK" dirty="0"/>
           </a:p>
         </p:txBody>
       </p:sp>
     </p:spTree>
     <p:extLst>
       <p:ext uri="{BB962C8B-B14F-4D97-AF65-F5344CB8AC3E}">
-        <p14:creationId xmlns:p14="http://schemas.microsoft.com/office/powerpoint/2010/main" val="1425229081"/>
+        <p14:creationId xmlns:p14="http://schemas.microsoft.com/office/powerpoint/2010/main" val="2637067341"/>
+      </p:ext>
+    </p:extLst>
+  </p:cSld>
+  <p:clrMapOvr>
+    <a:masterClrMapping/>
+  </p:clrMapOvr>
+</p:sld>
+</file>
+
+<file path=ppt/slides/slide9.xml><?xml version="1.0" encoding="utf-8"?>
+<p:sld xmlns:a="http://schemas.openxmlformats.org/drawingml/2006/main" xmlns:r="http://schemas.openxmlformats.org/officeDocument/2006/relationships" xmlns:p="http://schemas.openxmlformats.org/presentationml/2006/main">
+  <p:cSld>
+    <p:spTree>
+      <p:nvGrpSpPr>
+        <p:cNvPr id="1" name=""/>
+        <p:cNvGrpSpPr/>
+        <p:nvPr/>
+      </p:nvGrpSpPr>
+      <p:grpSpPr>
+        <a:xfrm>
+          <a:off x="0" y="0"/>
+          <a:ext cx="0" cy="0"/>
+          <a:chOff x="0" y="0"/>
+          <a:chExt cx="0" cy="0"/>
+        </a:xfrm>
+      </p:grpSpPr>
+      <p:sp>
+        <p:nvSpPr>
+          <p:cNvPr id="2" name="Titel 1">
+            <a:extLst>
+              <a:ext uri="{FF2B5EF4-FFF2-40B4-BE49-F238E27FC236}">
+                <a16:creationId xmlns:a16="http://schemas.microsoft.com/office/drawing/2014/main" id="{0F613089-72EC-4ED7-9E33-99BD386B2CAD}"/>
+              </a:ext>
+            </a:extLst>
+          </p:cNvPr>
+          <p:cNvSpPr>
+            <a:spLocks noGrp="1"/>
+          </p:cNvSpPr>
+          <p:nvPr>
+            <p:ph type="title"/>
+          </p:nvPr>
+        </p:nvSpPr>
+        <p:spPr/>
+        <p:txBody>
+          <a:bodyPr/>
+          <a:lstStyle/>
+          <a:p>
+            <a:r>
+              <a:rPr lang="en-US" dirty="0"/>
+              <a:t>L</a:t>
+            </a:r>
+            <a:r>
+              <a:rPr lang="en-DK" dirty="0" err="1"/>
+              <a:t>ifecycle</a:t>
+            </a:r>
+            <a:r>
+              <a:rPr lang="en-DK" dirty="0"/>
+              <a:t> management</a:t>
+            </a:r>
+          </a:p>
+        </p:txBody>
+      </p:sp>
+      <p:sp>
+        <p:nvSpPr>
+          <p:cNvPr id="3" name="Pladsholder til indhold 2">
+            <a:extLst>
+              <a:ext uri="{FF2B5EF4-FFF2-40B4-BE49-F238E27FC236}">
+                <a16:creationId xmlns:a16="http://schemas.microsoft.com/office/drawing/2014/main" id="{F9967604-D824-4702-8D3C-1251F9A6ECEB}"/>
+              </a:ext>
+            </a:extLst>
+          </p:cNvPr>
+          <p:cNvSpPr>
+            <a:spLocks noGrp="1"/>
+          </p:cNvSpPr>
+          <p:nvPr>
+            <p:ph idx="1"/>
+          </p:nvPr>
+        </p:nvSpPr>
+        <p:spPr/>
+        <p:txBody>
+          <a:bodyPr/>
+          <a:lstStyle/>
+          <a:p>
+            <a:r>
+              <a:rPr lang="en-US" dirty="0"/>
+              <a:t>The garbage Collector</a:t>
+            </a:r>
+          </a:p>
+          <a:p>
+            <a:r>
+              <a:rPr lang="en-US" dirty="0"/>
+              <a:t>Memory Leak</a:t>
+            </a:r>
+          </a:p>
+          <a:p>
+            <a:r>
+              <a:rPr lang="en-US" dirty="0"/>
+              <a:t>Event</a:t>
+            </a:r>
+          </a:p>
+          <a:p>
+            <a:r>
+              <a:rPr lang="en-US" dirty="0"/>
+              <a:t>Weak References</a:t>
+            </a:r>
+          </a:p>
+          <a:p>
+            <a:r>
+              <a:rPr lang="en-US" dirty="0"/>
+              <a:t>Finalization</a:t>
+            </a:r>
+            <a:endParaRPr lang="en-DK" dirty="0"/>
+          </a:p>
+        </p:txBody>
+      </p:sp>
+    </p:spTree>
+    <p:extLst>
+      <p:ext uri="{BB962C8B-B14F-4D97-AF65-F5344CB8AC3E}">
+        <p14:creationId xmlns:p14="http://schemas.microsoft.com/office/powerpoint/2010/main" val="1031306613"/>
       </p:ext>
     </p:extLst>
   </p:cSld>

</xml_diff>